<commit_message>
data modeling indexing updates
</commit_message>
<xml_diff>
--- a/decks/Data-Modeling.pptx
+++ b/decks/Data-Modeling.pptx
@@ -5,10 +5,10 @@
     <p:sldMasterId id="2147484407" r:id="rId3"/>
   </p:sldMasterIdLst>
   <p:notesMasterIdLst>
-    <p:notesMasterId r:id="rId38"/>
+    <p:notesMasterId r:id="rId41"/>
   </p:notesMasterIdLst>
   <p:handoutMasterIdLst>
-    <p:handoutMasterId r:id="rId39"/>
+    <p:handoutMasterId r:id="rId42"/>
   </p:handoutMasterIdLst>
   <p:sldIdLst>
     <p:sldId id="4591" r:id="rId4"/>
@@ -42,9 +42,12 @@
     <p:sldId id="359" r:id="rId32"/>
     <p:sldId id="4594" r:id="rId33"/>
     <p:sldId id="1956" r:id="rId34"/>
-    <p:sldId id="4596" r:id="rId35"/>
-    <p:sldId id="4597" r:id="rId36"/>
-    <p:sldId id="1960" r:id="rId37"/>
+    <p:sldId id="4694" r:id="rId35"/>
+    <p:sldId id="4696" r:id="rId36"/>
+    <p:sldId id="4695" r:id="rId37"/>
+    <p:sldId id="4596" r:id="rId38"/>
+    <p:sldId id="4597" r:id="rId39"/>
+    <p:sldId id="1960" r:id="rId40"/>
   </p:sldIdLst>
   <p:sldSz cx="12192000" cy="6858000"/>
   <p:notesSz cx="6858000" cy="9144000"/>
@@ -179,6 +182,9 @@
             <p14:sldId id="359"/>
             <p14:sldId id="4594"/>
             <p14:sldId id="1956"/>
+            <p14:sldId id="4694"/>
+            <p14:sldId id="4696"/>
+            <p14:sldId id="4695"/>
             <p14:sldId id="4596"/>
             <p14:sldId id="4597"/>
             <p14:sldId id="1960"/>
@@ -313,7 +319,7 @@
               <a:rPr lang="en-US" smtClean="0">
                 <a:latin typeface="Arial" panose="020B0604020202020204" pitchFamily="34" charset="0"/>
               </a:rPr>
-              <a:t>5/28/2019</a:t>
+              <a:t>5/30/2019</a:t>
             </a:fld>
             <a:endParaRPr lang="en-US" dirty="0">
               <a:latin typeface="Arial" panose="020B0604020202020204" pitchFamily="34" charset="0"/>
@@ -503,7 +509,7 @@
             <a:fld id="{C3B508DD-CDB9-4EE9-8F98-E98C69349142}" type="datetimeFigureOut">
               <a:rPr lang="en-US" smtClean="0"/>
               <a:pPr/>
-              <a:t>5/28/2019</a:t>
+              <a:t>5/30/2019</a:t>
             </a:fld>
             <a:endParaRPr lang="en-US" dirty="0"/>
           </a:p>
@@ -987,10 +993,7 @@
           <a:bodyPr/>
           <a:lstStyle/>
           <a:p>
-            <a:r>
-              <a:rPr lang="en-US"/>
-              <a:t>Index transformations are made online. This means that the documents indexed per the old policy are efficiently transformed per the new policy without affecting the write availability or the provisioned throughput of the collection. The consistency of read and write operations made by using the REST API, SDKs, or from within stored procedures and triggers is not affected during index transformation. There's no performance degradation or downtime to your apps when you make an indexing policy change.</a:t>
-            </a:r>
+            <a:endParaRPr lang="en-US" dirty="0"/>
           </a:p>
         </p:txBody>
       </p:sp>
@@ -1001,7 +1004,7 @@
             <a:spLocks noGrp="1"/>
           </p:cNvSpPr>
           <p:nvPr>
-            <p:ph type="sldNum" sz="quarter" idx="10"/>
+            <p:ph type="sldNum" sz="quarter" idx="5"/>
           </p:nvPr>
         </p:nvSpPr>
         <p:spPr/>
@@ -1009,18 +1012,19 @@
           <a:bodyPr/>
           <a:lstStyle/>
           <a:p>
-            <a:fld id="{4249A09B-4A39-974B-9594-129A7470D52A}" type="slidenum">
+            <a:fld id="{DE955128-46DB-4B46-8D54-0B8BFA51CA0B}" type="slidenum">
               <a:rPr lang="en-US" smtClean="0"/>
+              <a:pPr/>
               <a:t>32</a:t>
             </a:fld>
-            <a:endParaRPr lang="en-US"/>
+            <a:endParaRPr lang="en-US" dirty="0"/>
           </a:p>
         </p:txBody>
       </p:sp>
     </p:spTree>
     <p:extLst>
       <p:ext uri="{BB962C8B-B14F-4D97-AF65-F5344CB8AC3E}">
-        <p14:creationId xmlns:p14="http://schemas.microsoft.com/office/powerpoint/2010/main" val="2347374786"/>
+        <p14:creationId xmlns:p14="http://schemas.microsoft.com/office/powerpoint/2010/main" val="675850014"/>
       </p:ext>
     </p:extLst>
   </p:cSld>
@@ -1074,39 +1078,94 @@
           <a:bodyPr/>
           <a:lstStyle/>
           <a:p>
-            <a:pPr marL="228600" indent="-228600">
-              <a:buAutoNum type="arabicPeriod"/>
-            </a:pPr>
+            <a:endParaRPr lang="en-US" dirty="0"/>
+          </a:p>
+        </p:txBody>
+      </p:sp>
+      <p:sp>
+        <p:nvSpPr>
+          <p:cNvPr id="4" name="Slide Number Placeholder 3"/>
+          <p:cNvSpPr>
+            <a:spLocks noGrp="1"/>
+          </p:cNvSpPr>
+          <p:nvPr>
+            <p:ph type="sldNum" sz="quarter" idx="5"/>
+          </p:nvPr>
+        </p:nvSpPr>
+        <p:spPr/>
+        <p:txBody>
+          <a:bodyPr/>
+          <a:lstStyle/>
+          <a:p>
+            <a:fld id="{DE955128-46DB-4B46-8D54-0B8BFA51CA0B}" type="slidenum">
+              <a:rPr lang="en-US" smtClean="0"/>
+              <a:pPr/>
+              <a:t>33</a:t>
+            </a:fld>
+            <a:endParaRPr lang="en-US" dirty="0"/>
+          </a:p>
+        </p:txBody>
+      </p:sp>
+    </p:spTree>
+    <p:extLst>
+      <p:ext uri="{BB962C8B-B14F-4D97-AF65-F5344CB8AC3E}">
+        <p14:creationId xmlns:p14="http://schemas.microsoft.com/office/powerpoint/2010/main" val="489034156"/>
+      </p:ext>
+    </p:extLst>
+  </p:cSld>
+  <p:clrMapOvr>
+    <a:masterClrMapping/>
+  </p:clrMapOvr>
+</p:notes>
+</file>
+
+<file path=ppt/notesSlides/notesSlide13.xml><?xml version="1.0" encoding="utf-8"?>
+<p:notes xmlns:a="http://schemas.openxmlformats.org/drawingml/2006/main" xmlns:r="http://schemas.openxmlformats.org/officeDocument/2006/relationships" xmlns:p="http://schemas.openxmlformats.org/presentationml/2006/main">
+  <p:cSld>
+    <p:spTree>
+      <p:nvGrpSpPr>
+        <p:cNvPr id="1" name=""/>
+        <p:cNvGrpSpPr/>
+        <p:nvPr/>
+      </p:nvGrpSpPr>
+      <p:grpSpPr>
+        <a:xfrm>
+          <a:off x="0" y="0"/>
+          <a:ext cx="0" cy="0"/>
+          <a:chOff x="0" y="0"/>
+          <a:chExt cx="0" cy="0"/>
+        </a:xfrm>
+      </p:grpSpPr>
+      <p:sp>
+        <p:nvSpPr>
+          <p:cNvPr id="2" name="Slide Image Placeholder 1"/>
+          <p:cNvSpPr>
+            <a:spLocks noGrp="1" noRot="1" noChangeAspect="1"/>
+          </p:cNvSpPr>
+          <p:nvPr>
+            <p:ph type="sldImg"/>
+          </p:nvPr>
+        </p:nvSpPr>
+        <p:spPr/>
+      </p:sp>
+      <p:sp>
+        <p:nvSpPr>
+          <p:cNvPr id="3" name="Notes Placeholder 2"/>
+          <p:cNvSpPr>
+            <a:spLocks noGrp="1"/>
+          </p:cNvSpPr>
+          <p:nvPr>
+            <p:ph type="body" idx="1"/>
+          </p:nvPr>
+        </p:nvSpPr>
+        <p:spPr/>
+        <p:txBody>
+          <a:bodyPr/>
+          <a:lstStyle/>
+          <a:p>
             <a:r>
               <a:rPr lang="en-US"/>
-              <a:t>Update index policy</a:t>
-            </a:r>
-          </a:p>
-          <a:p>
-            <a:pPr marL="228600" indent="-228600">
-              <a:buAutoNum type="arabicPeriod"/>
-            </a:pPr>
-            <a:r>
-              <a:rPr lang="en-US"/>
-              <a:t>Query collection</a:t>
-            </a:r>
-          </a:p>
-          <a:p>
-            <a:pPr marL="228600" indent="-228600">
-              <a:buAutoNum type="arabicPeriod"/>
-            </a:pPr>
-            <a:r>
-              <a:rPr lang="en-US"/>
-              <a:t>View Results</a:t>
-            </a:r>
-          </a:p>
-          <a:p>
-            <a:pPr marL="228600" indent="-228600">
-              <a:buAutoNum type="arabicPeriod"/>
-            </a:pPr>
-            <a:r>
-              <a:rPr lang="en-US"/>
-              <a:t>Repeat Step 1</a:t>
+              <a:t>Index transformations are made online. This means that the documents indexed per the old policy are efficiently transformed per the new policy without affecting the write availability or the provisioned throughput of the collection. The consistency of read and write operations made by using the REST API, SDKs, or from within stored procedures and triggers is not affected during index transformation. There's no performance degradation or downtime to your apps when you make an indexing policy change.</a:t>
             </a:r>
           </a:p>
         </p:txBody>
@@ -1128,7 +1187,124 @@
           <a:p>
             <a:fld id="{4249A09B-4A39-974B-9594-129A7470D52A}" type="slidenum">
               <a:rPr lang="en-US" smtClean="0"/>
-              <a:t>33</a:t>
+              <a:t>35</a:t>
+            </a:fld>
+            <a:endParaRPr lang="en-US"/>
+          </a:p>
+        </p:txBody>
+      </p:sp>
+    </p:spTree>
+    <p:extLst>
+      <p:ext uri="{BB962C8B-B14F-4D97-AF65-F5344CB8AC3E}">
+        <p14:creationId xmlns:p14="http://schemas.microsoft.com/office/powerpoint/2010/main" val="2347374786"/>
+      </p:ext>
+    </p:extLst>
+  </p:cSld>
+  <p:clrMapOvr>
+    <a:masterClrMapping/>
+  </p:clrMapOvr>
+</p:notes>
+</file>
+
+<file path=ppt/notesSlides/notesSlide14.xml><?xml version="1.0" encoding="utf-8"?>
+<p:notes xmlns:a="http://schemas.openxmlformats.org/drawingml/2006/main" xmlns:r="http://schemas.openxmlformats.org/officeDocument/2006/relationships" xmlns:p="http://schemas.openxmlformats.org/presentationml/2006/main">
+  <p:cSld>
+    <p:spTree>
+      <p:nvGrpSpPr>
+        <p:cNvPr id="1" name=""/>
+        <p:cNvGrpSpPr/>
+        <p:nvPr/>
+      </p:nvGrpSpPr>
+      <p:grpSpPr>
+        <a:xfrm>
+          <a:off x="0" y="0"/>
+          <a:ext cx="0" cy="0"/>
+          <a:chOff x="0" y="0"/>
+          <a:chExt cx="0" cy="0"/>
+        </a:xfrm>
+      </p:grpSpPr>
+      <p:sp>
+        <p:nvSpPr>
+          <p:cNvPr id="2" name="Slide Image Placeholder 1"/>
+          <p:cNvSpPr>
+            <a:spLocks noGrp="1" noRot="1" noChangeAspect="1"/>
+          </p:cNvSpPr>
+          <p:nvPr>
+            <p:ph type="sldImg"/>
+          </p:nvPr>
+        </p:nvSpPr>
+        <p:spPr/>
+      </p:sp>
+      <p:sp>
+        <p:nvSpPr>
+          <p:cNvPr id="3" name="Notes Placeholder 2"/>
+          <p:cNvSpPr>
+            <a:spLocks noGrp="1"/>
+          </p:cNvSpPr>
+          <p:nvPr>
+            <p:ph type="body" idx="1"/>
+          </p:nvPr>
+        </p:nvSpPr>
+        <p:spPr/>
+        <p:txBody>
+          <a:bodyPr/>
+          <a:lstStyle/>
+          <a:p>
+            <a:pPr marL="228600" indent="-228600">
+              <a:buAutoNum type="arabicPeriod"/>
+            </a:pPr>
+            <a:r>
+              <a:rPr lang="en-US"/>
+              <a:t>Update index policy</a:t>
+            </a:r>
+          </a:p>
+          <a:p>
+            <a:pPr marL="228600" indent="-228600">
+              <a:buAutoNum type="arabicPeriod"/>
+            </a:pPr>
+            <a:r>
+              <a:rPr lang="en-US"/>
+              <a:t>Query collection</a:t>
+            </a:r>
+          </a:p>
+          <a:p>
+            <a:pPr marL="228600" indent="-228600">
+              <a:buAutoNum type="arabicPeriod"/>
+            </a:pPr>
+            <a:r>
+              <a:rPr lang="en-US"/>
+              <a:t>View Results</a:t>
+            </a:r>
+          </a:p>
+          <a:p>
+            <a:pPr marL="228600" indent="-228600">
+              <a:buAutoNum type="arabicPeriod"/>
+            </a:pPr>
+            <a:r>
+              <a:rPr lang="en-US"/>
+              <a:t>Repeat Step 1</a:t>
+            </a:r>
+          </a:p>
+        </p:txBody>
+      </p:sp>
+      <p:sp>
+        <p:nvSpPr>
+          <p:cNvPr id="4" name="Slide Number Placeholder 3"/>
+          <p:cNvSpPr>
+            <a:spLocks noGrp="1"/>
+          </p:cNvSpPr>
+          <p:nvPr>
+            <p:ph type="sldNum" sz="quarter" idx="10"/>
+          </p:nvPr>
+        </p:nvSpPr>
+        <p:spPr/>
+        <p:txBody>
+          <a:bodyPr/>
+          <a:lstStyle/>
+          <a:p>
+            <a:fld id="{4249A09B-4A39-974B-9594-129A7470D52A}" type="slidenum">
+              <a:rPr lang="en-US" smtClean="0"/>
+              <a:t>36</a:t>
             </a:fld>
             <a:endParaRPr lang="en-US"/>
           </a:p>
@@ -2511,7 +2687,7 @@
           <a:p>
             <a:fld id="{D01120C9-890A-4013-ADCB-1DF4AE2150B6}" type="datetimeFigureOut">
               <a:rPr lang="en-US" smtClean="0"/>
-              <a:t>5/28/2019</a:t>
+              <a:t>5/30/2019</a:t>
             </a:fld>
             <a:endParaRPr lang="en-US"/>
           </a:p>
@@ -2686,7 +2862,7 @@
           <a:p>
             <a:fld id="{C764DE79-268F-4C1A-8933-263129D2AF90}" type="datetimeFigureOut">
               <a:rPr lang="en-US" smtClean="0"/>
-              <a:t>5/28/2019</a:t>
+              <a:t>5/30/2019</a:t>
             </a:fld>
             <a:endParaRPr lang="en-US" dirty="0"/>
           </a:p>
@@ -2866,7 +3042,7 @@
           <a:p>
             <a:fld id="{C764DE79-268F-4C1A-8933-263129D2AF90}" type="datetimeFigureOut">
               <a:rPr lang="en-US" smtClean="0"/>
-              <a:t>5/28/2019</a:t>
+              <a:t>5/30/2019</a:t>
             </a:fld>
             <a:endParaRPr lang="en-US" dirty="0"/>
           </a:p>
@@ -3646,7 +3822,7 @@
           <a:p>
             <a:fld id="{9912175C-3CF6-487A-9684-5B9CA6422935}" type="datetimeFigureOut">
               <a:rPr lang="en-US" smtClean="0"/>
-              <a:t>5/28/2019</a:t>
+              <a:t>5/30/2019</a:t>
             </a:fld>
             <a:endParaRPr lang="en-US"/>
           </a:p>
@@ -3892,7 +4068,7 @@
           <a:p>
             <a:fld id="{C764DE79-268F-4C1A-8933-263129D2AF90}" type="datetimeFigureOut">
               <a:rPr lang="en-US" smtClean="0"/>
-              <a:t>5/28/2019</a:t>
+              <a:t>5/30/2019</a:t>
             </a:fld>
             <a:endParaRPr lang="en-US" dirty="0"/>
           </a:p>
@@ -4124,7 +4300,7 @@
           <a:p>
             <a:fld id="{C764DE79-268F-4C1A-8933-263129D2AF90}" type="datetimeFigureOut">
               <a:rPr lang="en-US" smtClean="0"/>
-              <a:t>5/28/2019</a:t>
+              <a:t>5/30/2019</a:t>
             </a:fld>
             <a:endParaRPr lang="en-US" dirty="0"/>
           </a:p>
@@ -4491,7 +4667,7 @@
           <a:p>
             <a:fld id="{C764DE79-268F-4C1A-8933-263129D2AF90}" type="datetimeFigureOut">
               <a:rPr lang="en-US" smtClean="0"/>
-              <a:t>5/28/2019</a:t>
+              <a:t>5/30/2019</a:t>
             </a:fld>
             <a:endParaRPr lang="en-US" dirty="0"/>
           </a:p>
@@ -4609,7 +4785,7 @@
           <a:p>
             <a:fld id="{C764DE79-268F-4C1A-8933-263129D2AF90}" type="datetimeFigureOut">
               <a:rPr lang="en-US" smtClean="0"/>
-              <a:t>5/28/2019</a:t>
+              <a:t>5/30/2019</a:t>
             </a:fld>
             <a:endParaRPr lang="en-US" dirty="0"/>
           </a:p>
@@ -4707,7 +4883,7 @@
           <a:p>
             <a:fld id="{D01120C9-890A-4013-ADCB-1DF4AE2150B6}" type="datetimeFigureOut">
               <a:rPr lang="en-US" smtClean="0"/>
-              <a:t>5/28/2019</a:t>
+              <a:t>5/30/2019</a:t>
             </a:fld>
             <a:endParaRPr lang="en-US"/>
           </a:p>
@@ -4984,7 +5160,7 @@
           <a:p>
             <a:fld id="{C764DE79-268F-4C1A-8933-263129D2AF90}" type="datetimeFigureOut">
               <a:rPr lang="en-US" smtClean="0"/>
-              <a:t>5/28/2019</a:t>
+              <a:t>5/30/2019</a:t>
             </a:fld>
             <a:endParaRPr lang="en-US" dirty="0"/>
           </a:p>
@@ -5241,7 +5417,7 @@
           <a:p>
             <a:fld id="{C764DE79-268F-4C1A-8933-263129D2AF90}" type="datetimeFigureOut">
               <a:rPr lang="en-US" smtClean="0"/>
-              <a:t>5/28/2019</a:t>
+              <a:t>5/30/2019</a:t>
             </a:fld>
             <a:endParaRPr lang="en-US" dirty="0"/>
           </a:p>
@@ -5454,7 +5630,7 @@
           <a:p>
             <a:fld id="{C764DE79-268F-4C1A-8933-263129D2AF90}" type="datetimeFigureOut">
               <a:rPr lang="en-US" smtClean="0"/>
-              <a:t>5/28/2019</a:t>
+              <a:t>5/30/2019</a:t>
             </a:fld>
             <a:endParaRPr lang="en-US" dirty="0"/>
           </a:p>
@@ -6002,7 +6178,7 @@
         </p:nvSpPr>
         <p:spPr>
           <a:xfrm>
-            <a:off x="0" y="0"/>
+            <a:off x="156932" y="-59344"/>
             <a:ext cx="10515600" cy="1325563"/>
           </a:xfrm>
           <a:prstGeom prst="rect">
@@ -6602,7 +6778,7 @@
         </p:nvSpPr>
         <p:spPr>
           <a:xfrm>
-            <a:off x="584200" y="-1577"/>
+            <a:off x="0" y="0"/>
             <a:ext cx="10515600" cy="1325563"/>
           </a:xfrm>
           <a:prstGeom prst="rect">
@@ -7237,7 +7413,7 @@
         </p:nvSpPr>
         <p:spPr>
           <a:xfrm>
-            <a:off x="0" y="52083"/>
+            <a:off x="-1" y="0"/>
             <a:ext cx="10515600" cy="1325563"/>
           </a:xfrm>
           <a:prstGeom prst="rect">
@@ -7811,7 +7987,7 @@
         </p:nvSpPr>
         <p:spPr>
           <a:xfrm>
-            <a:off x="0" y="0"/>
+            <a:off x="20683" y="0"/>
             <a:ext cx="10515600" cy="1325563"/>
           </a:xfrm>
           <a:prstGeom prst="rect">
@@ -7843,7 +8019,7 @@
           </a:lstStyle>
           <a:p>
             <a:r>
-              <a:rPr lang="en-US" dirty="0">
+              <a:rPr lang="en-US" sz="4000" dirty="0">
                 <a:latin typeface="Arial" panose="020B0604020202020204" pitchFamily="34" charset="0"/>
                 <a:cs typeface="Arial" panose="020B0604020202020204" pitchFamily="34" charset="0"/>
               </a:rPr>
@@ -8337,7 +8513,7 @@
         </p:nvSpPr>
         <p:spPr>
           <a:xfrm>
-            <a:off x="0" y="-38873"/>
+            <a:off x="-12629" y="0"/>
             <a:ext cx="10515600" cy="1325563"/>
           </a:xfrm>
           <a:prstGeom prst="rect">
@@ -9105,7 +9281,7 @@
         </p:nvSpPr>
         <p:spPr>
           <a:xfrm>
-            <a:off x="0" y="-40237"/>
+            <a:off x="51" y="0"/>
             <a:ext cx="10515600" cy="1325563"/>
           </a:xfrm>
         </p:spPr>
@@ -10497,7 +10673,7 @@
         </p:nvSpPr>
         <p:spPr>
           <a:xfrm>
-            <a:off x="250941" y="281542"/>
+            <a:off x="0" y="14673"/>
             <a:ext cx="6876299" cy="817275"/>
           </a:xfrm>
         </p:spPr>
@@ -11400,7 +11576,7 @@
         </p:nvSpPr>
         <p:spPr>
           <a:xfrm>
-            <a:off x="0" y="-3763"/>
+            <a:off x="0" y="-10161"/>
             <a:ext cx="10515600" cy="1325563"/>
           </a:xfrm>
         </p:spPr>
@@ -12451,7 +12627,7 @@
         </p:nvSpPr>
         <p:spPr>
           <a:xfrm>
-            <a:off x="0" y="0"/>
+            <a:off x="9739" y="0"/>
             <a:ext cx="10515600" cy="1325563"/>
           </a:xfrm>
         </p:spPr>
@@ -26487,17 +26663,19 @@
         </p:nvSpPr>
         <p:spPr/>
         <p:txBody>
-          <a:bodyPr/>
+          <a:bodyPr>
+            <a:normAutofit/>
+          </a:bodyPr>
           <a:lstStyle/>
           <a:p>
             <a:r>
-              <a:rPr lang="en-US" dirty="0">
+              <a:rPr lang="en-US" sz="4000" dirty="0">
                 <a:latin typeface="Arial" panose="020B0604020202020204" pitchFamily="34" charset="0"/>
                 <a:cs typeface="Arial" panose="020B0604020202020204" pitchFamily="34" charset="0"/>
               </a:rPr>
               <a:t>Indexing JSON Documents</a:t>
             </a:r>
-            <a:endParaRPr lang="en-US" dirty="0"/>
+            <a:endParaRPr lang="en-US" sz="4000" dirty="0"/>
           </a:p>
         </p:txBody>
       </p:sp>
@@ -32290,11 +32468,16 @@
         </p:nvSpPr>
         <p:spPr/>
         <p:txBody>
-          <a:bodyPr/>
+          <a:bodyPr>
+            <a:normAutofit/>
+          </a:bodyPr>
           <a:lstStyle/>
           <a:p>
             <a:r>
-              <a:rPr lang="en-US"/>
+              <a:rPr lang="en-US" sz="4000" dirty="0">
+                <a:latin typeface="Arial" panose="020B0604020202020204" pitchFamily="34" charset="0"/>
+                <a:cs typeface="Arial" panose="020B0604020202020204" pitchFamily="34" charset="0"/>
+              </a:rPr>
               <a:t>Inverted Index</a:t>
             </a:r>
           </a:p>
@@ -37861,7 +38044,7 @@
           <a:lstStyle/>
           <a:p>
             <a:r>
-              <a:rPr lang="en-US"/>
+              <a:rPr lang="en-US" dirty="0"/>
               <a:t>Indexing Policy</a:t>
             </a:r>
           </a:p>
@@ -38357,7 +38540,1279 @@
           <p:cNvPr id="2" name="Title 1">
             <a:extLst>
               <a:ext uri="{FF2B5EF4-FFF2-40B4-BE49-F238E27FC236}">
-                <a16:creationId xmlns:a16="http://schemas.microsoft.com/office/drawing/2014/main" id="{E6CB0C23-EB23-442F-AA69-31B4837D2540}"/>
+                <a16:creationId xmlns:a16="http://schemas.microsoft.com/office/drawing/2014/main" id="{46796B93-DE87-464B-A6E7-0A4AE51AF026}"/>
+              </a:ext>
+            </a:extLst>
+          </p:cNvPr>
+          <p:cNvSpPr>
+            <a:spLocks noGrp="1"/>
+          </p:cNvSpPr>
+          <p:nvPr>
+            <p:ph type="title"/>
+          </p:nvPr>
+        </p:nvSpPr>
+        <p:spPr>
+          <a:xfrm>
+            <a:off x="269240" y="289511"/>
+            <a:ext cx="11655840" cy="899665"/>
+          </a:xfrm>
+        </p:spPr>
+        <p:txBody>
+          <a:bodyPr/>
+          <a:lstStyle/>
+          <a:p>
+            <a:r>
+              <a:rPr lang="en-US" dirty="0"/>
+              <a:t>Range Indexes</a:t>
+            </a:r>
+          </a:p>
+        </p:txBody>
+      </p:sp>
+      <p:sp>
+        <p:nvSpPr>
+          <p:cNvPr id="3" name="Text Placeholder 2">
+            <a:extLst>
+              <a:ext uri="{FF2B5EF4-FFF2-40B4-BE49-F238E27FC236}">
+                <a16:creationId xmlns:a16="http://schemas.microsoft.com/office/drawing/2014/main" id="{B035F8F1-732F-4A82-A7E2-B1855349412E}"/>
+              </a:ext>
+            </a:extLst>
+          </p:cNvPr>
+          <p:cNvSpPr>
+            <a:spLocks noGrp="1"/>
+          </p:cNvSpPr>
+          <p:nvPr>
+            <p:ph type="body" sz="quarter" idx="11"/>
+          </p:nvPr>
+        </p:nvSpPr>
+        <p:spPr>
+          <a:xfrm>
+            <a:off x="269874" y="1584156"/>
+            <a:ext cx="11655206" cy="4751330"/>
+          </a:xfrm>
+        </p:spPr>
+        <p:txBody>
+          <a:bodyPr>
+            <a:normAutofit fontScale="92500" lnSpcReduction="10000"/>
+          </a:bodyPr>
+          <a:lstStyle/>
+          <a:p>
+            <a:r>
+              <a:rPr lang="en-US" sz="2800" dirty="0"/>
+              <a:t>These </a:t>
+            </a:r>
+            <a:r>
+              <a:rPr lang="en-US" sz="2800" u="sng" dirty="0"/>
+              <a:t>are created by default </a:t>
+            </a:r>
+            <a:r>
+              <a:rPr lang="en-US" sz="2800" dirty="0"/>
+              <a:t>for each property and are needed for:</a:t>
+            </a:r>
+          </a:p>
+          <a:p>
+            <a:pPr lvl="0" eaLnBrk="0" fontAlgn="base" hangingPunct="0">
+              <a:lnSpc>
+                <a:spcPct val="100000"/>
+              </a:lnSpc>
+              <a:spcBef>
+                <a:spcPct val="0"/>
+              </a:spcBef>
+              <a:spcAft>
+                <a:spcPct val="0"/>
+              </a:spcAft>
+            </a:pPr>
+            <a:endParaRPr lang="en-US" altLang="en-US" sz="2400" b="0" dirty="0">
+              <a:solidFill>
+                <a:schemeClr val="tx1"/>
+              </a:solidFill>
+            </a:endParaRPr>
+          </a:p>
+          <a:p>
+            <a:pPr lvl="0" eaLnBrk="0" fontAlgn="base" hangingPunct="0">
+              <a:lnSpc>
+                <a:spcPct val="100000"/>
+              </a:lnSpc>
+              <a:spcBef>
+                <a:spcPct val="0"/>
+              </a:spcBef>
+              <a:spcAft>
+                <a:spcPct val="0"/>
+              </a:spcAft>
+            </a:pPr>
+            <a:r>
+              <a:rPr lang="en-US" altLang="en-US" sz="2400" dirty="0">
+                <a:solidFill>
+                  <a:srgbClr val="000000"/>
+                </a:solidFill>
+                <a:latin typeface="Segoe UI" panose="020B0502040204020203" pitchFamily="34" charset="0"/>
+                <a:cs typeface="Segoe UI" panose="020B0502040204020203" pitchFamily="34" charset="0"/>
+              </a:rPr>
+              <a:t>Equality queries:</a:t>
+            </a:r>
+          </a:p>
+          <a:p>
+            <a:pPr lvl="0" eaLnBrk="0" fontAlgn="base" hangingPunct="0">
+              <a:lnSpc>
+                <a:spcPct val="100000"/>
+              </a:lnSpc>
+              <a:spcBef>
+                <a:spcPct val="0"/>
+              </a:spcBef>
+              <a:spcAft>
+                <a:spcPct val="0"/>
+              </a:spcAft>
+            </a:pPr>
+            <a:r>
+              <a:rPr lang="en-US" altLang="en-US" sz="2400" b="0" dirty="0">
+                <a:solidFill>
+                  <a:srgbClr val="000000"/>
+                </a:solidFill>
+                <a:latin typeface="Consolas" panose="020B0609020204030204" pitchFamily="49" charset="0"/>
+                <a:cs typeface="Segoe UI" panose="020B0502040204020203" pitchFamily="34" charset="0"/>
+              </a:rPr>
+              <a:t>SELECT * FROM container c WHERE </a:t>
+            </a:r>
+            <a:r>
+              <a:rPr lang="en-US" altLang="en-US" sz="2400" b="0" dirty="0" err="1">
+                <a:solidFill>
+                  <a:srgbClr val="000000"/>
+                </a:solidFill>
+                <a:latin typeface="Consolas" panose="020B0609020204030204" pitchFamily="49" charset="0"/>
+                <a:cs typeface="Segoe UI" panose="020B0502040204020203" pitchFamily="34" charset="0"/>
+              </a:rPr>
+              <a:t>c.property</a:t>
+            </a:r>
+            <a:r>
+              <a:rPr lang="en-US" altLang="en-US" sz="2400" b="0" dirty="0">
+                <a:solidFill>
+                  <a:srgbClr val="000000"/>
+                </a:solidFill>
+                <a:latin typeface="Consolas" panose="020B0609020204030204" pitchFamily="49" charset="0"/>
+                <a:cs typeface="Segoe UI" panose="020B0502040204020203" pitchFamily="34" charset="0"/>
+              </a:rPr>
+              <a:t> = 'value’</a:t>
+            </a:r>
+            <a:endParaRPr lang="en-US" altLang="en-US" sz="2400" b="0" dirty="0">
+              <a:solidFill>
+                <a:srgbClr val="000000"/>
+              </a:solidFill>
+              <a:latin typeface="Segoe UI" panose="020B0502040204020203" pitchFamily="34" charset="0"/>
+              <a:cs typeface="Segoe UI" panose="020B0502040204020203" pitchFamily="34" charset="0"/>
+            </a:endParaRPr>
+          </a:p>
+          <a:p>
+            <a:pPr lvl="0" eaLnBrk="0" fontAlgn="base" hangingPunct="0">
+              <a:lnSpc>
+                <a:spcPct val="100000"/>
+              </a:lnSpc>
+              <a:spcBef>
+                <a:spcPct val="0"/>
+              </a:spcBef>
+              <a:spcAft>
+                <a:spcPct val="0"/>
+              </a:spcAft>
+            </a:pPr>
+            <a:endParaRPr lang="en-US" altLang="en-US" sz="2400" b="0" dirty="0">
+              <a:solidFill>
+                <a:srgbClr val="000000"/>
+              </a:solidFill>
+              <a:latin typeface="Segoe UI" panose="020B0502040204020203" pitchFamily="34" charset="0"/>
+              <a:cs typeface="Segoe UI" panose="020B0502040204020203" pitchFamily="34" charset="0"/>
+            </a:endParaRPr>
+          </a:p>
+          <a:p>
+            <a:pPr lvl="0" eaLnBrk="0" fontAlgn="base" hangingPunct="0">
+              <a:lnSpc>
+                <a:spcPct val="100000"/>
+              </a:lnSpc>
+              <a:spcBef>
+                <a:spcPct val="0"/>
+              </a:spcBef>
+              <a:spcAft>
+                <a:spcPct val="0"/>
+              </a:spcAft>
+            </a:pPr>
+            <a:r>
+              <a:rPr lang="en-US" altLang="en-US" sz="2400" dirty="0">
+                <a:solidFill>
+                  <a:srgbClr val="000000"/>
+                </a:solidFill>
+                <a:latin typeface="Segoe UI" panose="020B0502040204020203" pitchFamily="34" charset="0"/>
+                <a:cs typeface="Segoe UI" panose="020B0502040204020203" pitchFamily="34" charset="0"/>
+              </a:rPr>
+              <a:t>Range queries:</a:t>
+            </a:r>
+          </a:p>
+          <a:p>
+            <a:pPr lvl="0" eaLnBrk="0" fontAlgn="base" hangingPunct="0">
+              <a:lnSpc>
+                <a:spcPct val="100000"/>
+              </a:lnSpc>
+              <a:spcBef>
+                <a:spcPct val="0"/>
+              </a:spcBef>
+              <a:spcAft>
+                <a:spcPct val="0"/>
+              </a:spcAft>
+            </a:pPr>
+            <a:r>
+              <a:rPr lang="en-US" altLang="en-US" sz="2400" b="0" dirty="0">
+                <a:solidFill>
+                  <a:srgbClr val="000000"/>
+                </a:solidFill>
+                <a:latin typeface="Consolas" panose="020B0609020204030204" pitchFamily="49" charset="0"/>
+                <a:cs typeface="Segoe UI" panose="020B0502040204020203" pitchFamily="34" charset="0"/>
+              </a:rPr>
+              <a:t>SELECT * FROM container c WHERE </a:t>
+            </a:r>
+            <a:r>
+              <a:rPr lang="en-US" altLang="en-US" sz="2400" b="0" dirty="0" err="1">
+                <a:solidFill>
+                  <a:srgbClr val="000000"/>
+                </a:solidFill>
+                <a:latin typeface="Consolas" panose="020B0609020204030204" pitchFamily="49" charset="0"/>
+                <a:cs typeface="Segoe UI" panose="020B0502040204020203" pitchFamily="34" charset="0"/>
+              </a:rPr>
+              <a:t>c.property</a:t>
+            </a:r>
+            <a:r>
+              <a:rPr lang="en-US" altLang="en-US" sz="2400" b="0" dirty="0">
+                <a:solidFill>
+                  <a:srgbClr val="000000"/>
+                </a:solidFill>
+                <a:latin typeface="Consolas" panose="020B0609020204030204" pitchFamily="49" charset="0"/>
+                <a:cs typeface="Segoe UI" panose="020B0502040204020203" pitchFamily="34" charset="0"/>
+              </a:rPr>
+              <a:t> &gt; 'value'</a:t>
+            </a:r>
+            <a:r>
+              <a:rPr lang="en-US" altLang="en-US" sz="2400" b="0" dirty="0">
+                <a:solidFill>
+                  <a:srgbClr val="000000"/>
+                </a:solidFill>
+                <a:latin typeface="Segoe UI" panose="020B0502040204020203" pitchFamily="34" charset="0"/>
+                <a:cs typeface="Segoe UI" panose="020B0502040204020203" pitchFamily="34" charset="0"/>
+              </a:rPr>
+              <a:t> (works for </a:t>
+            </a:r>
+            <a:r>
+              <a:rPr lang="en-US" altLang="en-US" sz="2400" b="0" dirty="0">
+                <a:solidFill>
+                  <a:srgbClr val="000000"/>
+                </a:solidFill>
+                <a:latin typeface="Consolas" panose="020B0609020204030204" pitchFamily="49" charset="0"/>
+                <a:cs typeface="Segoe UI" panose="020B0502040204020203" pitchFamily="34" charset="0"/>
+              </a:rPr>
+              <a:t>&gt;</a:t>
+            </a:r>
+            <a:r>
+              <a:rPr lang="en-US" altLang="en-US" sz="2400" b="0" dirty="0">
+                <a:solidFill>
+                  <a:srgbClr val="000000"/>
+                </a:solidFill>
+                <a:latin typeface="Segoe UI" panose="020B0502040204020203" pitchFamily="34" charset="0"/>
+                <a:cs typeface="Segoe UI" panose="020B0502040204020203" pitchFamily="34" charset="0"/>
+              </a:rPr>
+              <a:t>, </a:t>
+            </a:r>
+            <a:r>
+              <a:rPr lang="en-US" altLang="en-US" sz="2400" b="0" dirty="0">
+                <a:solidFill>
+                  <a:srgbClr val="000000"/>
+                </a:solidFill>
+                <a:latin typeface="Consolas" panose="020B0609020204030204" pitchFamily="49" charset="0"/>
+                <a:cs typeface="Segoe UI" panose="020B0502040204020203" pitchFamily="34" charset="0"/>
+              </a:rPr>
+              <a:t>&lt;</a:t>
+            </a:r>
+            <a:r>
+              <a:rPr lang="en-US" altLang="en-US" sz="2400" b="0" dirty="0">
+                <a:solidFill>
+                  <a:srgbClr val="000000"/>
+                </a:solidFill>
+                <a:latin typeface="Segoe UI" panose="020B0502040204020203" pitchFamily="34" charset="0"/>
+                <a:cs typeface="Segoe UI" panose="020B0502040204020203" pitchFamily="34" charset="0"/>
+              </a:rPr>
+              <a:t>, </a:t>
+            </a:r>
+            <a:r>
+              <a:rPr lang="en-US" altLang="en-US" sz="2400" b="0" dirty="0">
+                <a:solidFill>
+                  <a:srgbClr val="000000"/>
+                </a:solidFill>
+                <a:latin typeface="Consolas" panose="020B0609020204030204" pitchFamily="49" charset="0"/>
+                <a:cs typeface="Segoe UI" panose="020B0502040204020203" pitchFamily="34" charset="0"/>
+              </a:rPr>
+              <a:t>&gt;=</a:t>
+            </a:r>
+            <a:r>
+              <a:rPr lang="en-US" altLang="en-US" sz="2400" b="0" dirty="0">
+                <a:solidFill>
+                  <a:srgbClr val="000000"/>
+                </a:solidFill>
+                <a:latin typeface="Segoe UI" panose="020B0502040204020203" pitchFamily="34" charset="0"/>
+                <a:cs typeface="Segoe UI" panose="020B0502040204020203" pitchFamily="34" charset="0"/>
+              </a:rPr>
+              <a:t>, </a:t>
+            </a:r>
+            <a:r>
+              <a:rPr lang="en-US" altLang="en-US" sz="2400" b="0" dirty="0">
+                <a:solidFill>
+                  <a:srgbClr val="000000"/>
+                </a:solidFill>
+                <a:latin typeface="Consolas" panose="020B0609020204030204" pitchFamily="49" charset="0"/>
+                <a:cs typeface="Segoe UI" panose="020B0502040204020203" pitchFamily="34" charset="0"/>
+              </a:rPr>
+              <a:t>&lt;=</a:t>
+            </a:r>
+            <a:r>
+              <a:rPr lang="en-US" altLang="en-US" sz="2400" b="0" dirty="0">
+                <a:solidFill>
+                  <a:srgbClr val="000000"/>
+                </a:solidFill>
+                <a:latin typeface="Segoe UI" panose="020B0502040204020203" pitchFamily="34" charset="0"/>
+                <a:cs typeface="Segoe UI" panose="020B0502040204020203" pitchFamily="34" charset="0"/>
+              </a:rPr>
+              <a:t>, </a:t>
+            </a:r>
+            <a:r>
+              <a:rPr lang="en-US" altLang="en-US" sz="2400" b="0" dirty="0">
+                <a:solidFill>
+                  <a:srgbClr val="000000"/>
+                </a:solidFill>
+                <a:latin typeface="Consolas" panose="020B0609020204030204" pitchFamily="49" charset="0"/>
+                <a:cs typeface="Segoe UI" panose="020B0502040204020203" pitchFamily="34" charset="0"/>
+              </a:rPr>
+              <a:t>!=</a:t>
+            </a:r>
+            <a:r>
+              <a:rPr lang="en-US" altLang="en-US" sz="2400" b="0" dirty="0">
+                <a:solidFill>
+                  <a:srgbClr val="000000"/>
+                </a:solidFill>
+                <a:latin typeface="Segoe UI" panose="020B0502040204020203" pitchFamily="34" charset="0"/>
+                <a:cs typeface="Segoe UI" panose="020B0502040204020203" pitchFamily="34" charset="0"/>
+              </a:rPr>
+              <a:t>)</a:t>
+            </a:r>
+          </a:p>
+          <a:p>
+            <a:pPr lvl="0" eaLnBrk="0" fontAlgn="base" hangingPunct="0">
+              <a:lnSpc>
+                <a:spcPct val="100000"/>
+              </a:lnSpc>
+              <a:spcBef>
+                <a:spcPct val="0"/>
+              </a:spcBef>
+              <a:spcAft>
+                <a:spcPct val="0"/>
+              </a:spcAft>
+            </a:pPr>
+            <a:endParaRPr lang="en-US" altLang="en-US" sz="2400" b="0" dirty="0">
+              <a:solidFill>
+                <a:srgbClr val="000000"/>
+              </a:solidFill>
+              <a:latin typeface="Consolas" panose="020B0609020204030204" pitchFamily="49" charset="0"/>
+              <a:cs typeface="Segoe UI" panose="020B0502040204020203" pitchFamily="34" charset="0"/>
+            </a:endParaRPr>
+          </a:p>
+          <a:p>
+            <a:pPr lvl="0" eaLnBrk="0" fontAlgn="base" hangingPunct="0">
+              <a:lnSpc>
+                <a:spcPct val="100000"/>
+              </a:lnSpc>
+              <a:spcBef>
+                <a:spcPct val="0"/>
+              </a:spcBef>
+              <a:spcAft>
+                <a:spcPct val="0"/>
+              </a:spcAft>
+            </a:pPr>
+            <a:r>
+              <a:rPr lang="en-US" altLang="en-US" sz="2400" dirty="0">
+                <a:solidFill>
+                  <a:srgbClr val="000000"/>
+                </a:solidFill>
+                <a:latin typeface="Consolas" panose="020B0609020204030204" pitchFamily="49" charset="0"/>
+                <a:cs typeface="Segoe UI" panose="020B0502040204020203" pitchFamily="34" charset="0"/>
+              </a:rPr>
+              <a:t>ORDER BY</a:t>
+            </a:r>
+            <a:r>
+              <a:rPr lang="en-US" altLang="en-US" sz="2400" dirty="0">
+                <a:solidFill>
+                  <a:srgbClr val="000000"/>
+                </a:solidFill>
+                <a:latin typeface="Segoe UI" panose="020B0502040204020203" pitchFamily="34" charset="0"/>
+                <a:cs typeface="Segoe UI" panose="020B0502040204020203" pitchFamily="34" charset="0"/>
+              </a:rPr>
+              <a:t> queries:</a:t>
+            </a:r>
+          </a:p>
+          <a:p>
+            <a:pPr lvl="0" eaLnBrk="0" fontAlgn="base" hangingPunct="0">
+              <a:lnSpc>
+                <a:spcPct val="100000"/>
+              </a:lnSpc>
+              <a:spcBef>
+                <a:spcPct val="0"/>
+              </a:spcBef>
+              <a:spcAft>
+                <a:spcPct val="0"/>
+              </a:spcAft>
+            </a:pPr>
+            <a:r>
+              <a:rPr lang="en-US" altLang="en-US" sz="2400" b="0" dirty="0">
+                <a:solidFill>
+                  <a:srgbClr val="000000"/>
+                </a:solidFill>
+                <a:latin typeface="Consolas" panose="020B0609020204030204" pitchFamily="49" charset="0"/>
+                <a:cs typeface="Segoe UI" panose="020B0502040204020203" pitchFamily="34" charset="0"/>
+              </a:rPr>
+              <a:t>SELECT * FROM container c ORDER BY </a:t>
+            </a:r>
+            <a:r>
+              <a:rPr lang="en-US" altLang="en-US" sz="2400" b="0" dirty="0" err="1">
+                <a:solidFill>
+                  <a:srgbClr val="000000"/>
+                </a:solidFill>
+                <a:latin typeface="Consolas" panose="020B0609020204030204" pitchFamily="49" charset="0"/>
+                <a:cs typeface="Segoe UI" panose="020B0502040204020203" pitchFamily="34" charset="0"/>
+              </a:rPr>
+              <a:t>c.property</a:t>
+            </a:r>
+            <a:endParaRPr lang="en-US" altLang="en-US" sz="2400" b="0" dirty="0">
+              <a:solidFill>
+                <a:srgbClr val="000000"/>
+              </a:solidFill>
+              <a:latin typeface="Segoe UI" panose="020B0502040204020203" pitchFamily="34" charset="0"/>
+              <a:cs typeface="Segoe UI" panose="020B0502040204020203" pitchFamily="34" charset="0"/>
+            </a:endParaRPr>
+          </a:p>
+          <a:p>
+            <a:pPr lvl="0" eaLnBrk="0" fontAlgn="base" hangingPunct="0">
+              <a:lnSpc>
+                <a:spcPct val="100000"/>
+              </a:lnSpc>
+              <a:spcBef>
+                <a:spcPct val="0"/>
+              </a:spcBef>
+              <a:spcAft>
+                <a:spcPct val="0"/>
+              </a:spcAft>
+            </a:pPr>
+            <a:endParaRPr lang="en-US" altLang="en-US" sz="2400" b="0" dirty="0">
+              <a:solidFill>
+                <a:srgbClr val="000000"/>
+              </a:solidFill>
+              <a:latin typeface="Consolas" panose="020B0609020204030204" pitchFamily="49" charset="0"/>
+              <a:cs typeface="Segoe UI" panose="020B0502040204020203" pitchFamily="34" charset="0"/>
+            </a:endParaRPr>
+          </a:p>
+          <a:p>
+            <a:pPr lvl="0" eaLnBrk="0" fontAlgn="base" hangingPunct="0">
+              <a:lnSpc>
+                <a:spcPct val="100000"/>
+              </a:lnSpc>
+              <a:spcBef>
+                <a:spcPct val="0"/>
+              </a:spcBef>
+              <a:spcAft>
+                <a:spcPct val="0"/>
+              </a:spcAft>
+            </a:pPr>
+            <a:r>
+              <a:rPr lang="en-US" altLang="en-US" sz="2400" dirty="0">
+                <a:solidFill>
+                  <a:srgbClr val="000000"/>
+                </a:solidFill>
+                <a:latin typeface="Consolas" panose="020B0609020204030204" pitchFamily="49" charset="0"/>
+                <a:cs typeface="Segoe UI" panose="020B0502040204020203" pitchFamily="34" charset="0"/>
+              </a:rPr>
+              <a:t>JOIN</a:t>
+            </a:r>
+            <a:r>
+              <a:rPr lang="en-US" altLang="en-US" sz="2400" dirty="0">
+                <a:solidFill>
+                  <a:srgbClr val="000000"/>
+                </a:solidFill>
+                <a:latin typeface="Segoe UI" panose="020B0502040204020203" pitchFamily="34" charset="0"/>
+                <a:cs typeface="Segoe UI" panose="020B0502040204020203" pitchFamily="34" charset="0"/>
+              </a:rPr>
+              <a:t> queries:</a:t>
+            </a:r>
+          </a:p>
+          <a:p>
+            <a:pPr lvl="0" eaLnBrk="0" fontAlgn="base" hangingPunct="0">
+              <a:lnSpc>
+                <a:spcPct val="100000"/>
+              </a:lnSpc>
+              <a:spcBef>
+                <a:spcPct val="0"/>
+              </a:spcBef>
+              <a:spcAft>
+                <a:spcPct val="0"/>
+              </a:spcAft>
+            </a:pPr>
+            <a:r>
+              <a:rPr lang="en-US" altLang="en-US" sz="2400" b="0" dirty="0">
+                <a:solidFill>
+                  <a:srgbClr val="000000"/>
+                </a:solidFill>
+                <a:latin typeface="Consolas" panose="020B0609020204030204" pitchFamily="49" charset="0"/>
+                <a:cs typeface="Segoe UI" panose="020B0502040204020203" pitchFamily="34" charset="0"/>
+              </a:rPr>
+              <a:t>SELECT child FROM container c JOIN child IN </a:t>
+            </a:r>
+            <a:r>
+              <a:rPr lang="en-US" altLang="en-US" sz="2400" b="0" dirty="0" err="1">
+                <a:solidFill>
+                  <a:srgbClr val="000000"/>
+                </a:solidFill>
+                <a:latin typeface="Consolas" panose="020B0609020204030204" pitchFamily="49" charset="0"/>
+                <a:cs typeface="Segoe UI" panose="020B0502040204020203" pitchFamily="34" charset="0"/>
+              </a:rPr>
+              <a:t>c.properties</a:t>
+            </a:r>
+            <a:r>
+              <a:rPr lang="en-US" altLang="en-US" sz="2400" b="0" dirty="0">
+                <a:solidFill>
+                  <a:srgbClr val="000000"/>
+                </a:solidFill>
+                <a:latin typeface="Consolas" panose="020B0609020204030204" pitchFamily="49" charset="0"/>
+                <a:cs typeface="Segoe UI" panose="020B0502040204020203" pitchFamily="34" charset="0"/>
+              </a:rPr>
+              <a:t> WHERE child = 'value'</a:t>
+            </a:r>
+            <a:endParaRPr lang="en-US" altLang="en-US" sz="2400" b="0" dirty="0">
+              <a:solidFill>
+                <a:srgbClr val="000000"/>
+              </a:solidFill>
+              <a:latin typeface="Segoe UI" panose="020B0502040204020203" pitchFamily="34" charset="0"/>
+              <a:cs typeface="Segoe UI" panose="020B0502040204020203" pitchFamily="34" charset="0"/>
+            </a:endParaRPr>
+          </a:p>
+          <a:p>
+            <a:endParaRPr lang="en-US" sz="2800" dirty="0"/>
+          </a:p>
+          <a:p>
+            <a:endParaRPr lang="en-US" sz="2800" dirty="0"/>
+          </a:p>
+          <a:p>
+            <a:endParaRPr lang="en-US" sz="2800" dirty="0"/>
+          </a:p>
+          <a:p>
+            <a:endParaRPr lang="en-US" sz="2800" dirty="0"/>
+          </a:p>
+          <a:p>
+            <a:endParaRPr lang="en-US" sz="2800" dirty="0"/>
+          </a:p>
+          <a:p>
+            <a:endParaRPr lang="en-US" sz="2800" dirty="0"/>
+          </a:p>
+          <a:p>
+            <a:endParaRPr lang="en-US" sz="2800" dirty="0"/>
+          </a:p>
+        </p:txBody>
+      </p:sp>
+      <p:sp>
+        <p:nvSpPr>
+          <p:cNvPr id="5" name="Rectangle 2">
+            <a:extLst>
+              <a:ext uri="{FF2B5EF4-FFF2-40B4-BE49-F238E27FC236}">
+                <a16:creationId xmlns:a16="http://schemas.microsoft.com/office/drawing/2014/main" id="{EAFA922F-2EF7-46B4-BC2F-B550B44722AD}"/>
+              </a:ext>
+            </a:extLst>
+          </p:cNvPr>
+          <p:cNvSpPr>
+            <a:spLocks noChangeArrowheads="1"/>
+          </p:cNvSpPr>
+          <p:nvPr/>
+        </p:nvSpPr>
+        <p:spPr bwMode="auto">
+          <a:xfrm>
+            <a:off x="0" y="-215419"/>
+            <a:ext cx="182749" cy="430839"/>
+          </a:xfrm>
+          <a:prstGeom prst="rect">
+            <a:avLst/>
+          </a:prstGeom>
+          <a:noFill/>
+          <a:ln>
+            <a:noFill/>
+          </a:ln>
+          <a:effectLst/>
+          <a:extLst>
+            <a:ext uri="{909E8E84-426E-40DD-AFC4-6F175D3DCCD1}">
+              <a14:hiddenFill xmlns:a14="http://schemas.microsoft.com/office/drawing/2010/main">
+                <a:solidFill>
+                  <a:schemeClr val="accent1"/>
+                </a:solidFill>
+              </a14:hiddenFill>
+            </a:ext>
+            <a:ext uri="{91240B29-F687-4F45-9708-019B960494DF}">
+              <a14:hiddenLine xmlns:a14="http://schemas.microsoft.com/office/drawing/2010/main" w="9525">
+                <a:solidFill>
+                  <a:schemeClr val="tx1"/>
+                </a:solidFill>
+                <a:miter lim="800000"/>
+                <a:headEnd/>
+                <a:tailEnd/>
+              </a14:hiddenLine>
+            </a:ext>
+            <a:ext uri="{AF507438-7753-43E0-B8FC-AC1667EBCBE1}">
+              <a14:hiddenEffects xmlns:a14="http://schemas.microsoft.com/office/drawing/2010/main">
+                <a:effectLst>
+                  <a:outerShdw dist="35921" dir="2700000" algn="ctr" rotWithShape="0">
+                    <a:schemeClr val="bg2"/>
+                  </a:outerShdw>
+                </a:effectLst>
+              </a14:hiddenEffects>
+            </a:ext>
+          </a:extLst>
+        </p:spPr>
+        <p:txBody>
+          <a:bodyPr vert="horz" wrap="none" lIns="180918" tIns="76176" rIns="0" bIns="76176" numCol="1" anchor="ctr" anchorCtr="0" compatLnSpc="1">
+            <a:prstTxWarp prst="textNoShape">
+              <a:avLst/>
+            </a:prstTxWarp>
+            <a:spAutoFit/>
+          </a:bodyPr>
+          <a:lstStyle/>
+          <a:p>
+            <a:pPr marL="0" marR="0" lvl="0" indent="0" algn="l" defTabSz="914400" rtl="0" eaLnBrk="0" fontAlgn="base" latinLnBrk="0" hangingPunct="0">
+              <a:lnSpc>
+                <a:spcPct val="100000"/>
+              </a:lnSpc>
+              <a:spcBef>
+                <a:spcPct val="0"/>
+              </a:spcBef>
+              <a:spcAft>
+                <a:spcPct val="0"/>
+              </a:spcAft>
+              <a:buClrTx/>
+              <a:buSzTx/>
+              <a:buFontTx/>
+              <a:buNone/>
+              <a:tabLst/>
+            </a:pPr>
+            <a:endParaRPr kumimoji="0" lang="en-US" altLang="en-US" sz="1800" b="0" i="0" u="none" strike="noStrike" cap="none" normalizeH="0" baseline="0" dirty="0">
+              <a:ln>
+                <a:noFill/>
+              </a:ln>
+              <a:solidFill>
+                <a:schemeClr val="tx1"/>
+              </a:solidFill>
+              <a:effectLst/>
+              <a:latin typeface="Arial" panose="020B0604020202020204" pitchFamily="34" charset="0"/>
+            </a:endParaRPr>
+          </a:p>
+        </p:txBody>
+      </p:sp>
+    </p:spTree>
+    <p:extLst>
+      <p:ext uri="{BB962C8B-B14F-4D97-AF65-F5344CB8AC3E}">
+        <p14:creationId xmlns:p14="http://schemas.microsoft.com/office/powerpoint/2010/main" val="791251124"/>
+      </p:ext>
+    </p:extLst>
+  </p:cSld>
+  <p:clrMapOvr>
+    <a:masterClrMapping/>
+  </p:clrMapOvr>
+  <p:transition>
+    <p:fade/>
+  </p:transition>
+</p:sld>
+</file>
+
+<file path=ppt/slides/slide33.xml><?xml version="1.0" encoding="utf-8"?>
+<p:sld xmlns:a="http://schemas.openxmlformats.org/drawingml/2006/main" xmlns:r="http://schemas.openxmlformats.org/officeDocument/2006/relationships" xmlns:p="http://schemas.openxmlformats.org/presentationml/2006/main">
+  <p:cSld>
+    <p:spTree>
+      <p:nvGrpSpPr>
+        <p:cNvPr id="1" name=""/>
+        <p:cNvGrpSpPr/>
+        <p:nvPr/>
+      </p:nvGrpSpPr>
+      <p:grpSpPr>
+        <a:xfrm>
+          <a:off x="0" y="0"/>
+          <a:ext cx="0" cy="0"/>
+          <a:chOff x="0" y="0"/>
+          <a:chExt cx="0" cy="0"/>
+        </a:xfrm>
+      </p:grpSpPr>
+      <p:sp>
+        <p:nvSpPr>
+          <p:cNvPr id="2" name="Title 1">
+            <a:extLst>
+              <a:ext uri="{FF2B5EF4-FFF2-40B4-BE49-F238E27FC236}">
+                <a16:creationId xmlns:a16="http://schemas.microsoft.com/office/drawing/2014/main" id="{46796B93-DE87-464B-A6E7-0A4AE51AF026}"/>
+              </a:ext>
+            </a:extLst>
+          </p:cNvPr>
+          <p:cNvSpPr>
+            <a:spLocks noGrp="1"/>
+          </p:cNvSpPr>
+          <p:nvPr>
+            <p:ph type="title"/>
+          </p:nvPr>
+        </p:nvSpPr>
+        <p:spPr>
+          <a:xfrm>
+            <a:off x="269240" y="289511"/>
+            <a:ext cx="11655840" cy="899665"/>
+          </a:xfrm>
+        </p:spPr>
+        <p:txBody>
+          <a:bodyPr/>
+          <a:lstStyle/>
+          <a:p>
+            <a:r>
+              <a:rPr lang="en-US" dirty="0"/>
+              <a:t>Spatial Indexes</a:t>
+            </a:r>
+          </a:p>
+        </p:txBody>
+      </p:sp>
+      <p:sp>
+        <p:nvSpPr>
+          <p:cNvPr id="3" name="Text Placeholder 2">
+            <a:extLst>
+              <a:ext uri="{FF2B5EF4-FFF2-40B4-BE49-F238E27FC236}">
+                <a16:creationId xmlns:a16="http://schemas.microsoft.com/office/drawing/2014/main" id="{B035F8F1-732F-4A82-A7E2-B1855349412E}"/>
+              </a:ext>
+            </a:extLst>
+          </p:cNvPr>
+          <p:cNvSpPr>
+            <a:spLocks noGrp="1"/>
+          </p:cNvSpPr>
+          <p:nvPr>
+            <p:ph type="body" sz="quarter" idx="11"/>
+          </p:nvPr>
+        </p:nvSpPr>
+        <p:spPr>
+          <a:xfrm>
+            <a:off x="269874" y="1584156"/>
+            <a:ext cx="11655206" cy="4751330"/>
+          </a:xfrm>
+        </p:spPr>
+        <p:txBody>
+          <a:bodyPr>
+            <a:normAutofit/>
+          </a:bodyPr>
+          <a:lstStyle/>
+          <a:p>
+            <a:r>
+              <a:rPr lang="en-US" sz="2800" dirty="0"/>
+              <a:t>These </a:t>
+            </a:r>
+            <a:r>
+              <a:rPr lang="en-US" sz="2800" u="sng" dirty="0"/>
+              <a:t>must be added </a:t>
+            </a:r>
+            <a:r>
+              <a:rPr lang="en-US" sz="2800" dirty="0"/>
+              <a:t>and are needed for geospatial queries:</a:t>
+            </a:r>
+          </a:p>
+          <a:p>
+            <a:pPr lvl="0" eaLnBrk="0" fontAlgn="base" hangingPunct="0">
+              <a:lnSpc>
+                <a:spcPct val="100000"/>
+              </a:lnSpc>
+              <a:spcBef>
+                <a:spcPct val="0"/>
+              </a:spcBef>
+              <a:spcAft>
+                <a:spcPct val="0"/>
+              </a:spcAft>
+            </a:pPr>
+            <a:endParaRPr lang="en-US" altLang="en-US" sz="2400" b="0" dirty="0">
+              <a:solidFill>
+                <a:schemeClr val="tx1"/>
+              </a:solidFill>
+            </a:endParaRPr>
+          </a:p>
+          <a:p>
+            <a:endParaRPr lang="en-US" sz="2800" dirty="0"/>
+          </a:p>
+          <a:p>
+            <a:endParaRPr lang="en-US" sz="2800" dirty="0"/>
+          </a:p>
+          <a:p>
+            <a:endParaRPr lang="en-US" sz="2800" dirty="0"/>
+          </a:p>
+          <a:p>
+            <a:endParaRPr lang="en-US" sz="2800" dirty="0"/>
+          </a:p>
+          <a:p>
+            <a:endParaRPr lang="en-US" sz="2800" dirty="0"/>
+          </a:p>
+          <a:p>
+            <a:endParaRPr lang="en-US" sz="2800" dirty="0"/>
+          </a:p>
+          <a:p>
+            <a:endParaRPr lang="en-US" sz="2800" dirty="0"/>
+          </a:p>
+        </p:txBody>
+      </p:sp>
+      <p:sp>
+        <p:nvSpPr>
+          <p:cNvPr id="5" name="Rectangle 2">
+            <a:extLst>
+              <a:ext uri="{FF2B5EF4-FFF2-40B4-BE49-F238E27FC236}">
+                <a16:creationId xmlns:a16="http://schemas.microsoft.com/office/drawing/2014/main" id="{EAFA922F-2EF7-46B4-BC2F-B550B44722AD}"/>
+              </a:ext>
+            </a:extLst>
+          </p:cNvPr>
+          <p:cNvSpPr>
+            <a:spLocks noChangeArrowheads="1"/>
+          </p:cNvSpPr>
+          <p:nvPr/>
+        </p:nvSpPr>
+        <p:spPr bwMode="auto">
+          <a:xfrm>
+            <a:off x="0" y="-215419"/>
+            <a:ext cx="182749" cy="430839"/>
+          </a:xfrm>
+          <a:prstGeom prst="rect">
+            <a:avLst/>
+          </a:prstGeom>
+          <a:noFill/>
+          <a:ln>
+            <a:noFill/>
+          </a:ln>
+          <a:effectLst/>
+          <a:extLst>
+            <a:ext uri="{909E8E84-426E-40DD-AFC4-6F175D3DCCD1}">
+              <a14:hiddenFill xmlns:a14="http://schemas.microsoft.com/office/drawing/2010/main">
+                <a:solidFill>
+                  <a:schemeClr val="accent1"/>
+                </a:solidFill>
+              </a14:hiddenFill>
+            </a:ext>
+            <a:ext uri="{91240B29-F687-4F45-9708-019B960494DF}">
+              <a14:hiddenLine xmlns:a14="http://schemas.microsoft.com/office/drawing/2010/main" w="9525">
+                <a:solidFill>
+                  <a:schemeClr val="tx1"/>
+                </a:solidFill>
+                <a:miter lim="800000"/>
+                <a:headEnd/>
+                <a:tailEnd/>
+              </a14:hiddenLine>
+            </a:ext>
+            <a:ext uri="{AF507438-7753-43E0-B8FC-AC1667EBCBE1}">
+              <a14:hiddenEffects xmlns:a14="http://schemas.microsoft.com/office/drawing/2010/main">
+                <a:effectLst>
+                  <a:outerShdw dist="35921" dir="2700000" algn="ctr" rotWithShape="0">
+                    <a:schemeClr val="bg2"/>
+                  </a:outerShdw>
+                </a:effectLst>
+              </a14:hiddenEffects>
+            </a:ext>
+          </a:extLst>
+        </p:spPr>
+        <p:txBody>
+          <a:bodyPr vert="horz" wrap="none" lIns="180918" tIns="76176" rIns="0" bIns="76176" numCol="1" anchor="ctr" anchorCtr="0" compatLnSpc="1">
+            <a:prstTxWarp prst="textNoShape">
+              <a:avLst/>
+            </a:prstTxWarp>
+            <a:spAutoFit/>
+          </a:bodyPr>
+          <a:lstStyle/>
+          <a:p>
+            <a:pPr marL="0" marR="0" lvl="0" indent="0" algn="l" defTabSz="914400" rtl="0" eaLnBrk="0" fontAlgn="base" latinLnBrk="0" hangingPunct="0">
+              <a:lnSpc>
+                <a:spcPct val="100000"/>
+              </a:lnSpc>
+              <a:spcBef>
+                <a:spcPct val="0"/>
+              </a:spcBef>
+              <a:spcAft>
+                <a:spcPct val="0"/>
+              </a:spcAft>
+              <a:buClrTx/>
+              <a:buSzTx/>
+              <a:buFontTx/>
+              <a:buNone/>
+              <a:tabLst/>
+            </a:pPr>
+            <a:endParaRPr kumimoji="0" lang="en-US" altLang="en-US" sz="1800" b="0" i="0" u="none" strike="noStrike" cap="none" normalizeH="0" baseline="0" dirty="0">
+              <a:ln>
+                <a:noFill/>
+              </a:ln>
+              <a:solidFill>
+                <a:schemeClr val="tx1"/>
+              </a:solidFill>
+              <a:effectLst/>
+              <a:latin typeface="Arial" panose="020B0604020202020204" pitchFamily="34" charset="0"/>
+            </a:endParaRPr>
+          </a:p>
+        </p:txBody>
+      </p:sp>
+      <p:sp>
+        <p:nvSpPr>
+          <p:cNvPr id="10" name="Rectangle 6">
+            <a:extLst>
+              <a:ext uri="{FF2B5EF4-FFF2-40B4-BE49-F238E27FC236}">
+                <a16:creationId xmlns:a16="http://schemas.microsoft.com/office/drawing/2014/main" id="{C213BB59-84A8-4436-AED3-16726F61328C}"/>
+              </a:ext>
+            </a:extLst>
+          </p:cNvPr>
+          <p:cNvSpPr>
+            <a:spLocks noChangeArrowheads="1"/>
+          </p:cNvSpPr>
+          <p:nvPr/>
+        </p:nvSpPr>
+        <p:spPr bwMode="auto">
+          <a:xfrm>
+            <a:off x="266920" y="2505777"/>
+            <a:ext cx="11655206" cy="2646830"/>
+          </a:xfrm>
+          <a:prstGeom prst="rect">
+            <a:avLst/>
+          </a:prstGeom>
+          <a:noFill/>
+          <a:ln>
+            <a:noFill/>
+          </a:ln>
+          <a:effectLst/>
+          <a:extLst>
+            <a:ext uri="{909E8E84-426E-40DD-AFC4-6F175D3DCCD1}">
+              <a14:hiddenFill xmlns:a14="http://schemas.microsoft.com/office/drawing/2010/main">
+                <a:solidFill>
+                  <a:schemeClr val="accent1"/>
+                </a:solidFill>
+              </a14:hiddenFill>
+            </a:ext>
+            <a:ext uri="{91240B29-F687-4F45-9708-019B960494DF}">
+              <a14:hiddenLine xmlns:a14="http://schemas.microsoft.com/office/drawing/2010/main" w="9525">
+                <a:solidFill>
+                  <a:schemeClr val="tx1"/>
+                </a:solidFill>
+                <a:miter lim="800000"/>
+                <a:headEnd/>
+                <a:tailEnd/>
+              </a14:hiddenLine>
+            </a:ext>
+            <a:ext uri="{AF507438-7753-43E0-B8FC-AC1667EBCBE1}">
+              <a14:hiddenEffects xmlns:a14="http://schemas.microsoft.com/office/drawing/2010/main">
+                <a:effectLst>
+                  <a:outerShdw dist="35921" dir="2700000" algn="ctr" rotWithShape="0">
+                    <a:schemeClr val="bg2"/>
+                  </a:outerShdw>
+                </a:effectLst>
+              </a14:hiddenEffects>
+            </a:ext>
+          </a:extLst>
+        </p:spPr>
+        <p:txBody>
+          <a:bodyPr vert="horz" wrap="square" lIns="180918" tIns="76176" rIns="0" bIns="76176" numCol="1" anchor="ctr" anchorCtr="0" compatLnSpc="1">
+            <a:prstTxWarp prst="textNoShape">
+              <a:avLst/>
+            </a:prstTxWarp>
+            <a:spAutoFit/>
+          </a:bodyPr>
+          <a:lstStyle/>
+          <a:p>
+            <a:pPr marL="0" marR="0" lvl="0" indent="0" algn="l" defTabSz="914400" rtl="0" eaLnBrk="0" fontAlgn="base" latinLnBrk="0" hangingPunct="0">
+              <a:lnSpc>
+                <a:spcPct val="100000"/>
+              </a:lnSpc>
+              <a:spcBef>
+                <a:spcPct val="0"/>
+              </a:spcBef>
+              <a:spcAft>
+                <a:spcPct val="0"/>
+              </a:spcAft>
+              <a:buClrTx/>
+              <a:buSzTx/>
+              <a:tabLst/>
+            </a:pPr>
+            <a:endParaRPr kumimoji="0" lang="en-US" altLang="en-US" sz="1200" b="0" i="0" u="none" strike="noStrike" cap="none" normalizeH="0" baseline="0" dirty="0">
+              <a:ln>
+                <a:noFill/>
+              </a:ln>
+              <a:solidFill>
+                <a:srgbClr val="000000"/>
+              </a:solidFill>
+              <a:effectLst/>
+              <a:latin typeface="Segoe UI" panose="020B0502040204020203" pitchFamily="34" charset="0"/>
+              <a:cs typeface="Segoe UI" panose="020B0502040204020203" pitchFamily="34" charset="0"/>
+            </a:endParaRPr>
+          </a:p>
+          <a:p>
+            <a:pPr marL="0" marR="0" lvl="0" indent="0" algn="l" defTabSz="914400" rtl="0" eaLnBrk="0" fontAlgn="base" latinLnBrk="0" hangingPunct="0">
+              <a:lnSpc>
+                <a:spcPct val="100000"/>
+              </a:lnSpc>
+              <a:spcBef>
+                <a:spcPct val="0"/>
+              </a:spcBef>
+              <a:spcAft>
+                <a:spcPct val="0"/>
+              </a:spcAft>
+              <a:buClrTx/>
+              <a:buSzTx/>
+              <a:tabLst/>
+            </a:pPr>
+            <a:r>
+              <a:rPr kumimoji="0" lang="en-US" altLang="en-US" sz="2200" b="1" i="0" u="none" strike="noStrike" cap="none" normalizeH="0" baseline="0" dirty="0">
+                <a:ln>
+                  <a:noFill/>
+                </a:ln>
+                <a:solidFill>
+                  <a:srgbClr val="000000"/>
+                </a:solidFill>
+                <a:effectLst/>
+                <a:latin typeface="Segoe UI" panose="020B0502040204020203" pitchFamily="34" charset="0"/>
+                <a:cs typeface="Segoe UI" panose="020B0502040204020203" pitchFamily="34" charset="0"/>
+              </a:rPr>
+              <a:t>Geospatial distance queries:</a:t>
+            </a:r>
+          </a:p>
+          <a:p>
+            <a:pPr marL="0" marR="0" lvl="0" indent="0" algn="l" defTabSz="914400" rtl="0" eaLnBrk="0" fontAlgn="base" latinLnBrk="0" hangingPunct="0">
+              <a:lnSpc>
+                <a:spcPct val="100000"/>
+              </a:lnSpc>
+              <a:spcBef>
+                <a:spcPct val="0"/>
+              </a:spcBef>
+              <a:spcAft>
+                <a:spcPct val="0"/>
+              </a:spcAft>
+              <a:buClrTx/>
+              <a:buSzTx/>
+              <a:buFontTx/>
+              <a:buNone/>
+              <a:tabLst/>
+            </a:pPr>
+            <a:r>
+              <a:rPr kumimoji="0" lang="en-US" altLang="en-US" sz="2200" b="0" i="0" u="none" strike="noStrike" cap="none" normalizeH="0" baseline="0" dirty="0">
+                <a:ln>
+                  <a:noFill/>
+                </a:ln>
+                <a:solidFill>
+                  <a:srgbClr val="000000"/>
+                </a:solidFill>
+                <a:effectLst/>
+                <a:latin typeface="Consolas" panose="020B0609020204030204" pitchFamily="49" charset="0"/>
+                <a:cs typeface="Segoe UI" panose="020B0502040204020203" pitchFamily="34" charset="0"/>
+              </a:rPr>
+              <a:t>SELECT * FROM container c WHERE ST_DISTANCE(</a:t>
+            </a:r>
+            <a:r>
+              <a:rPr kumimoji="0" lang="en-US" altLang="en-US" sz="2200" b="0" i="0" u="none" strike="noStrike" cap="none" normalizeH="0" baseline="0" dirty="0" err="1">
+                <a:ln>
+                  <a:noFill/>
+                </a:ln>
+                <a:solidFill>
+                  <a:srgbClr val="000000"/>
+                </a:solidFill>
+                <a:effectLst/>
+                <a:latin typeface="Consolas" panose="020B0609020204030204" pitchFamily="49" charset="0"/>
+                <a:cs typeface="Segoe UI" panose="020B0502040204020203" pitchFamily="34" charset="0"/>
+              </a:rPr>
+              <a:t>c.property</a:t>
+            </a:r>
+            <a:r>
+              <a:rPr kumimoji="0" lang="en-US" altLang="en-US" sz="2200" b="0" i="0" u="none" strike="noStrike" cap="none" normalizeH="0" baseline="0" dirty="0">
+                <a:ln>
+                  <a:noFill/>
+                </a:ln>
+                <a:solidFill>
+                  <a:srgbClr val="000000"/>
+                </a:solidFill>
+                <a:effectLst/>
+                <a:latin typeface="Consolas" panose="020B0609020204030204" pitchFamily="49" charset="0"/>
+                <a:cs typeface="Segoe UI" panose="020B0502040204020203" pitchFamily="34" charset="0"/>
+              </a:rPr>
+              <a:t>, { "type": "Point", "coordinates": [0.0, 10.0] }) &lt; 40</a:t>
+            </a:r>
+            <a:endParaRPr kumimoji="0" lang="en-US" altLang="en-US" sz="2200" b="0" i="0" u="none" strike="noStrike" cap="none" normalizeH="0" baseline="0" dirty="0">
+              <a:ln>
+                <a:noFill/>
+              </a:ln>
+              <a:solidFill>
+                <a:srgbClr val="000000"/>
+              </a:solidFill>
+              <a:effectLst/>
+              <a:latin typeface="Segoe UI" panose="020B0502040204020203" pitchFamily="34" charset="0"/>
+              <a:cs typeface="Segoe UI" panose="020B0502040204020203" pitchFamily="34" charset="0"/>
+            </a:endParaRPr>
+          </a:p>
+          <a:p>
+            <a:pPr marL="0" marR="0" lvl="0" indent="0" algn="l" defTabSz="914400" rtl="0" eaLnBrk="0" fontAlgn="base" latinLnBrk="0" hangingPunct="0">
+              <a:lnSpc>
+                <a:spcPct val="100000"/>
+              </a:lnSpc>
+              <a:spcBef>
+                <a:spcPct val="0"/>
+              </a:spcBef>
+              <a:spcAft>
+                <a:spcPct val="0"/>
+              </a:spcAft>
+              <a:buClrTx/>
+              <a:buSzTx/>
+              <a:tabLst/>
+            </a:pPr>
+            <a:r>
+              <a:rPr kumimoji="0" lang="en-US" altLang="en-US" sz="2200" b="1" i="0" u="none" strike="noStrike" cap="none" normalizeH="0" baseline="0" dirty="0">
+                <a:ln>
+                  <a:noFill/>
+                </a:ln>
+                <a:solidFill>
+                  <a:srgbClr val="000000"/>
+                </a:solidFill>
+                <a:effectLst/>
+                <a:latin typeface="Segoe UI" panose="020B0502040204020203" pitchFamily="34" charset="0"/>
+                <a:cs typeface="Segoe UI" panose="020B0502040204020203" pitchFamily="34" charset="0"/>
+              </a:rPr>
+              <a:t>Geospatial within queries:</a:t>
+            </a:r>
+          </a:p>
+          <a:p>
+            <a:pPr marL="0" marR="0" lvl="0" indent="0" algn="l" defTabSz="914400" rtl="0" eaLnBrk="0" fontAlgn="base" latinLnBrk="0" hangingPunct="0">
+              <a:lnSpc>
+                <a:spcPct val="100000"/>
+              </a:lnSpc>
+              <a:spcBef>
+                <a:spcPct val="0"/>
+              </a:spcBef>
+              <a:spcAft>
+                <a:spcPct val="0"/>
+              </a:spcAft>
+              <a:buClrTx/>
+              <a:buSzTx/>
+              <a:buFontTx/>
+              <a:buNone/>
+              <a:tabLst/>
+            </a:pPr>
+            <a:r>
+              <a:rPr kumimoji="0" lang="en-US" altLang="en-US" sz="2200" b="0" i="0" u="none" strike="noStrike" cap="none" normalizeH="0" baseline="0" dirty="0">
+                <a:ln>
+                  <a:noFill/>
+                </a:ln>
+                <a:solidFill>
+                  <a:srgbClr val="000000"/>
+                </a:solidFill>
+                <a:effectLst/>
+                <a:latin typeface="Consolas" panose="020B0609020204030204" pitchFamily="49" charset="0"/>
+                <a:cs typeface="Segoe UI" panose="020B0502040204020203" pitchFamily="34" charset="0"/>
+              </a:rPr>
+              <a:t>SELECT * FROM container c WHERE ST_WITHIN(</a:t>
+            </a:r>
+            <a:r>
+              <a:rPr kumimoji="0" lang="en-US" altLang="en-US" sz="2200" b="0" i="0" u="none" strike="noStrike" cap="none" normalizeH="0" baseline="0" dirty="0" err="1">
+                <a:ln>
+                  <a:noFill/>
+                </a:ln>
+                <a:solidFill>
+                  <a:srgbClr val="000000"/>
+                </a:solidFill>
+                <a:effectLst/>
+                <a:latin typeface="Consolas" panose="020B0609020204030204" pitchFamily="49" charset="0"/>
+                <a:cs typeface="Segoe UI" panose="020B0502040204020203" pitchFamily="34" charset="0"/>
+              </a:rPr>
+              <a:t>c.property</a:t>
+            </a:r>
+            <a:r>
+              <a:rPr kumimoji="0" lang="en-US" altLang="en-US" sz="2200" b="0" i="0" u="none" strike="noStrike" cap="none" normalizeH="0" baseline="0" dirty="0">
+                <a:ln>
+                  <a:noFill/>
+                </a:ln>
+                <a:solidFill>
+                  <a:srgbClr val="000000"/>
+                </a:solidFill>
+                <a:effectLst/>
+                <a:latin typeface="Consolas" panose="020B0609020204030204" pitchFamily="49" charset="0"/>
+                <a:cs typeface="Segoe UI" panose="020B0502040204020203" pitchFamily="34" charset="0"/>
+              </a:rPr>
+              <a:t>, {"type": "Point", "coordinates": [0.0, 10.0] } })</a:t>
+            </a:r>
+            <a:endParaRPr kumimoji="0" lang="en-US" altLang="en-US" sz="2200" b="0" i="0" u="none" strike="noStrike" cap="none" normalizeH="0" baseline="0" dirty="0">
+              <a:ln>
+                <a:noFill/>
+              </a:ln>
+              <a:solidFill>
+                <a:srgbClr val="000000"/>
+              </a:solidFill>
+              <a:effectLst/>
+              <a:latin typeface="Segoe UI" panose="020B0502040204020203" pitchFamily="34" charset="0"/>
+              <a:cs typeface="Segoe UI" panose="020B0502040204020203" pitchFamily="34" charset="0"/>
+            </a:endParaRPr>
+          </a:p>
+          <a:p>
+            <a:pPr marL="0" marR="0" lvl="0" indent="0" algn="l" defTabSz="914400" rtl="0" eaLnBrk="0" fontAlgn="base" latinLnBrk="0" hangingPunct="0">
+              <a:lnSpc>
+                <a:spcPct val="100000"/>
+              </a:lnSpc>
+              <a:spcBef>
+                <a:spcPct val="0"/>
+              </a:spcBef>
+              <a:spcAft>
+                <a:spcPct val="0"/>
+              </a:spcAft>
+              <a:buClrTx/>
+              <a:buSzTx/>
+              <a:buFontTx/>
+              <a:buNone/>
+              <a:tabLst/>
+            </a:pPr>
+            <a:endParaRPr kumimoji="0" lang="en-US" altLang="en-US" sz="1800" b="0" i="0" u="none" strike="noStrike" cap="none" normalizeH="0" baseline="0" dirty="0">
+              <a:ln>
+                <a:noFill/>
+              </a:ln>
+              <a:solidFill>
+                <a:schemeClr val="tx1"/>
+              </a:solidFill>
+              <a:effectLst/>
+              <a:latin typeface="Arial" panose="020B0604020202020204" pitchFamily="34" charset="0"/>
+            </a:endParaRPr>
+          </a:p>
+        </p:txBody>
+      </p:sp>
+    </p:spTree>
+    <p:extLst>
+      <p:ext uri="{BB962C8B-B14F-4D97-AF65-F5344CB8AC3E}">
+        <p14:creationId xmlns:p14="http://schemas.microsoft.com/office/powerpoint/2010/main" val="1753674250"/>
+      </p:ext>
+    </p:extLst>
+  </p:cSld>
+  <p:clrMapOvr>
+    <a:masterClrMapping/>
+  </p:clrMapOvr>
+  <p:transition>
+    <p:fade/>
+  </p:transition>
+</p:sld>
+</file>
+
+<file path=ppt/slides/slide34.xml><?xml version="1.0" encoding="utf-8"?>
+<p:sld xmlns:a="http://schemas.openxmlformats.org/drawingml/2006/main" xmlns:r="http://schemas.openxmlformats.org/officeDocument/2006/relationships" xmlns:p="http://schemas.openxmlformats.org/presentationml/2006/main">
+  <p:cSld>
+    <p:spTree>
+      <p:nvGrpSpPr>
+        <p:cNvPr id="1" name=""/>
+        <p:cNvGrpSpPr/>
+        <p:nvPr/>
+      </p:nvGrpSpPr>
+      <p:grpSpPr>
+        <a:xfrm>
+          <a:off x="0" y="0"/>
+          <a:ext cx="0" cy="0"/>
+          <a:chOff x="0" y="0"/>
+          <a:chExt cx="0" cy="0"/>
+        </a:xfrm>
+      </p:grpSpPr>
+      <p:sp>
+        <p:nvSpPr>
+          <p:cNvPr id="2" name="Title 1">
+            <a:extLst>
+              <a:ext uri="{FF2B5EF4-FFF2-40B4-BE49-F238E27FC236}">
+                <a16:creationId xmlns:a16="http://schemas.microsoft.com/office/drawing/2014/main" id="{46796B93-DE87-464B-A6E7-0A4AE51AF026}"/>
               </a:ext>
             </a:extLst>
           </p:cNvPr>
@@ -38374,7 +39829,457 @@
           <a:lstStyle/>
           <a:p>
             <a:r>
-              <a:rPr lang="en-US"/>
+              <a:rPr lang="en-US" dirty="0"/>
+              <a:t>Composite Indexes</a:t>
+            </a:r>
+          </a:p>
+        </p:txBody>
+      </p:sp>
+      <p:sp>
+        <p:nvSpPr>
+          <p:cNvPr id="3" name="Text Placeholder 2">
+            <a:extLst>
+              <a:ext uri="{FF2B5EF4-FFF2-40B4-BE49-F238E27FC236}">
+                <a16:creationId xmlns:a16="http://schemas.microsoft.com/office/drawing/2014/main" id="{B035F8F1-732F-4A82-A7E2-B1855349412E}"/>
+              </a:ext>
+            </a:extLst>
+          </p:cNvPr>
+          <p:cNvSpPr>
+            <a:spLocks noGrp="1"/>
+          </p:cNvSpPr>
+          <p:nvPr>
+            <p:ph type="body" sz="quarter" idx="11"/>
+          </p:nvPr>
+        </p:nvSpPr>
+        <p:spPr>
+          <a:xfrm>
+            <a:off x="269874" y="1584156"/>
+            <a:ext cx="11655206" cy="4751330"/>
+          </a:xfrm>
+        </p:spPr>
+        <p:txBody>
+          <a:bodyPr>
+            <a:normAutofit/>
+          </a:bodyPr>
+          <a:lstStyle/>
+          <a:p>
+            <a:endParaRPr lang="en-US" sz="2800" dirty="0"/>
+          </a:p>
+          <a:p>
+            <a:endParaRPr lang="en-US" sz="2800" dirty="0"/>
+          </a:p>
+          <a:p>
+            <a:endParaRPr lang="en-US" sz="2800" dirty="0"/>
+          </a:p>
+          <a:p>
+            <a:endParaRPr lang="en-US" sz="2800" dirty="0"/>
+          </a:p>
+          <a:p>
+            <a:endParaRPr lang="en-US" sz="2800" dirty="0"/>
+          </a:p>
+        </p:txBody>
+      </p:sp>
+      <p:sp>
+        <p:nvSpPr>
+          <p:cNvPr id="4" name="Text Placeholder 2">
+            <a:extLst>
+              <a:ext uri="{FF2B5EF4-FFF2-40B4-BE49-F238E27FC236}">
+                <a16:creationId xmlns:a16="http://schemas.microsoft.com/office/drawing/2014/main" id="{6853D164-3818-4711-A0EF-1DDEF6DB4DBB}"/>
+              </a:ext>
+            </a:extLst>
+          </p:cNvPr>
+          <p:cNvSpPr txBox="1">
+            <a:spLocks/>
+          </p:cNvSpPr>
+          <p:nvPr/>
+        </p:nvSpPr>
+        <p:spPr>
+          <a:xfrm>
+            <a:off x="268397" y="1584156"/>
+            <a:ext cx="11655206" cy="4751330"/>
+          </a:xfrm>
+          <a:prstGeom prst="rect">
+            <a:avLst/>
+          </a:prstGeom>
+        </p:spPr>
+        <p:txBody>
+          <a:bodyPr vert="horz" lIns="91440" tIns="45720" rIns="91440" bIns="45720" rtlCol="0">
+            <a:normAutofit/>
+          </a:bodyPr>
+          <a:lstStyle>
+            <a:lvl1pPr marL="0" indent="0" algn="l" defTabSz="914400" rtl="0" eaLnBrk="1" latinLnBrk="0" hangingPunct="1">
+              <a:lnSpc>
+                <a:spcPct val="90000"/>
+              </a:lnSpc>
+              <a:spcBef>
+                <a:spcPts val="1200"/>
+              </a:spcBef>
+              <a:buFont typeface="Arial" panose="020B0604020202020204" pitchFamily="34" charset="0"/>
+              <a:buNone/>
+              <a:defRPr lang="en-US" sz="1600" b="1" kern="1200" spc="0" baseline="0" dirty="0" smtClean="0">
+                <a:solidFill>
+                  <a:schemeClr val="tx2"/>
+                </a:solidFill>
+                <a:latin typeface="Arial" panose="020B0604020202020204" pitchFamily="34" charset="0"/>
+                <a:ea typeface="Arial" panose="020B0604020202020204" pitchFamily="34" charset="0"/>
+                <a:cs typeface="Arial" panose="020B0604020202020204" pitchFamily="34" charset="0"/>
+              </a:defRPr>
+            </a:lvl1pPr>
+            <a:lvl2pPr marL="236538" indent="-236538" algn="l" defTabSz="914400" rtl="0" eaLnBrk="1" latinLnBrk="0" hangingPunct="1">
+              <a:lnSpc>
+                <a:spcPct val="90000"/>
+              </a:lnSpc>
+              <a:spcBef>
+                <a:spcPts val="800"/>
+              </a:spcBef>
+              <a:spcAft>
+                <a:spcPts val="400"/>
+              </a:spcAft>
+              <a:buClr>
+                <a:schemeClr val="tx2"/>
+              </a:buClr>
+              <a:buFont typeface="Arial" panose="020B0604020202020204" pitchFamily="34" charset="0"/>
+              <a:buChar char="•"/>
+              <a:defRPr lang="en-US" sz="1600" kern="1200" spc="0" baseline="0" dirty="0" smtClean="0">
+                <a:solidFill>
+                  <a:schemeClr val="tx1"/>
+                </a:solidFill>
+                <a:latin typeface="Arial" panose="020B0604020202020204" pitchFamily="34" charset="0"/>
+                <a:ea typeface="Arial" panose="020B0604020202020204" pitchFamily="34" charset="0"/>
+                <a:cs typeface="Arial" panose="020B0604020202020204" pitchFamily="34" charset="0"/>
+              </a:defRPr>
+            </a:lvl2pPr>
+            <a:lvl3pPr marL="1143000" indent="-228600" algn="l" defTabSz="914400" rtl="0" eaLnBrk="1" latinLnBrk="0" hangingPunct="1">
+              <a:lnSpc>
+                <a:spcPct val="90000"/>
+              </a:lnSpc>
+              <a:spcBef>
+                <a:spcPts val="500"/>
+              </a:spcBef>
+              <a:buFont typeface="Arial" panose="020B0604020202020204" pitchFamily="34" charset="0"/>
+              <a:buChar char="•"/>
+              <a:defRPr sz="2000" kern="1200">
+                <a:solidFill>
+                  <a:schemeClr val="tx1"/>
+                </a:solidFill>
+                <a:latin typeface="+mn-lt"/>
+                <a:ea typeface="+mn-ea"/>
+                <a:cs typeface="+mn-cs"/>
+              </a:defRPr>
+            </a:lvl3pPr>
+            <a:lvl4pPr marL="1600200" indent="-228600" algn="l" defTabSz="914400" rtl="0" eaLnBrk="1" latinLnBrk="0" hangingPunct="1">
+              <a:lnSpc>
+                <a:spcPct val="90000"/>
+              </a:lnSpc>
+              <a:spcBef>
+                <a:spcPts val="500"/>
+              </a:spcBef>
+              <a:buFont typeface="Arial" panose="020B0604020202020204" pitchFamily="34" charset="0"/>
+              <a:buChar char="•"/>
+              <a:defRPr sz="1800" kern="1200">
+                <a:solidFill>
+                  <a:schemeClr val="tx1"/>
+                </a:solidFill>
+                <a:latin typeface="+mn-lt"/>
+                <a:ea typeface="+mn-ea"/>
+                <a:cs typeface="+mn-cs"/>
+              </a:defRPr>
+            </a:lvl4pPr>
+            <a:lvl5pPr marL="2057400" indent="-228600" algn="l" defTabSz="914400" rtl="0" eaLnBrk="1" latinLnBrk="0" hangingPunct="1">
+              <a:lnSpc>
+                <a:spcPct val="90000"/>
+              </a:lnSpc>
+              <a:spcBef>
+                <a:spcPts val="500"/>
+              </a:spcBef>
+              <a:buFont typeface="Arial" panose="020B0604020202020204" pitchFamily="34" charset="0"/>
+              <a:buChar char="•"/>
+              <a:defRPr sz="1800" kern="1200">
+                <a:solidFill>
+                  <a:schemeClr val="tx1"/>
+                </a:solidFill>
+                <a:latin typeface="+mn-lt"/>
+                <a:ea typeface="+mn-ea"/>
+                <a:cs typeface="+mn-cs"/>
+              </a:defRPr>
+            </a:lvl5pPr>
+            <a:lvl6pPr marL="2514600" indent="-228600" algn="l" defTabSz="914400" rtl="0" eaLnBrk="1" latinLnBrk="0" hangingPunct="1">
+              <a:lnSpc>
+                <a:spcPct val="90000"/>
+              </a:lnSpc>
+              <a:spcBef>
+                <a:spcPts val="500"/>
+              </a:spcBef>
+              <a:buFont typeface="Arial" panose="020B0604020202020204" pitchFamily="34" charset="0"/>
+              <a:buChar char="•"/>
+              <a:defRPr sz="1800" kern="1200">
+                <a:solidFill>
+                  <a:schemeClr val="tx1"/>
+                </a:solidFill>
+                <a:latin typeface="+mn-lt"/>
+                <a:ea typeface="+mn-ea"/>
+                <a:cs typeface="+mn-cs"/>
+              </a:defRPr>
+            </a:lvl6pPr>
+            <a:lvl7pPr marL="2971800" indent="-228600" algn="l" defTabSz="914400" rtl="0" eaLnBrk="1" latinLnBrk="0" hangingPunct="1">
+              <a:lnSpc>
+                <a:spcPct val="90000"/>
+              </a:lnSpc>
+              <a:spcBef>
+                <a:spcPts val="500"/>
+              </a:spcBef>
+              <a:buFont typeface="Arial" panose="020B0604020202020204" pitchFamily="34" charset="0"/>
+              <a:buChar char="•"/>
+              <a:defRPr sz="1800" kern="1200">
+                <a:solidFill>
+                  <a:schemeClr val="tx1"/>
+                </a:solidFill>
+                <a:latin typeface="+mn-lt"/>
+                <a:ea typeface="+mn-ea"/>
+                <a:cs typeface="+mn-cs"/>
+              </a:defRPr>
+            </a:lvl7pPr>
+            <a:lvl8pPr marL="3429000" indent="-228600" algn="l" defTabSz="914400" rtl="0" eaLnBrk="1" latinLnBrk="0" hangingPunct="1">
+              <a:lnSpc>
+                <a:spcPct val="90000"/>
+              </a:lnSpc>
+              <a:spcBef>
+                <a:spcPts val="500"/>
+              </a:spcBef>
+              <a:buFont typeface="Arial" panose="020B0604020202020204" pitchFamily="34" charset="0"/>
+              <a:buChar char="•"/>
+              <a:defRPr sz="1800" kern="1200">
+                <a:solidFill>
+                  <a:schemeClr val="tx1"/>
+                </a:solidFill>
+                <a:latin typeface="+mn-lt"/>
+                <a:ea typeface="+mn-ea"/>
+                <a:cs typeface="+mn-cs"/>
+              </a:defRPr>
+            </a:lvl8pPr>
+            <a:lvl9pPr marL="3886200" indent="-228600" algn="l" defTabSz="914400" rtl="0" eaLnBrk="1" latinLnBrk="0" hangingPunct="1">
+              <a:lnSpc>
+                <a:spcPct val="90000"/>
+              </a:lnSpc>
+              <a:spcBef>
+                <a:spcPts val="500"/>
+              </a:spcBef>
+              <a:buFont typeface="Arial" panose="020B0604020202020204" pitchFamily="34" charset="0"/>
+              <a:buChar char="•"/>
+              <a:defRPr sz="1800" kern="1200">
+                <a:solidFill>
+                  <a:schemeClr val="tx1"/>
+                </a:solidFill>
+                <a:latin typeface="+mn-lt"/>
+                <a:ea typeface="+mn-ea"/>
+                <a:cs typeface="+mn-cs"/>
+              </a:defRPr>
+            </a:lvl9pPr>
+          </a:lstStyle>
+          <a:p>
+            <a:r>
+              <a:rPr lang="en-US" sz="2800" dirty="0"/>
+              <a:t>These </a:t>
+            </a:r>
+            <a:r>
+              <a:rPr lang="en-US" sz="2800" u="sng" dirty="0"/>
+              <a:t>must be added </a:t>
+            </a:r>
+            <a:r>
+              <a:rPr lang="en-US" sz="2800" dirty="0"/>
+              <a:t>and are needed for queries that ORDER BY two or more properties.</a:t>
+            </a:r>
+          </a:p>
+          <a:p>
+            <a:endParaRPr lang="en-US" sz="2800" dirty="0"/>
+          </a:p>
+          <a:p>
+            <a:pPr lvl="0" eaLnBrk="0" fontAlgn="base" hangingPunct="0">
+              <a:lnSpc>
+                <a:spcPct val="100000"/>
+              </a:lnSpc>
+              <a:spcBef>
+                <a:spcPct val="0"/>
+              </a:spcBef>
+              <a:spcAft>
+                <a:spcPct val="0"/>
+              </a:spcAft>
+            </a:pPr>
+            <a:r>
+              <a:rPr lang="en-US" altLang="en-US" sz="2200" dirty="0">
+                <a:solidFill>
+                  <a:srgbClr val="000000"/>
+                </a:solidFill>
+              </a:rPr>
+              <a:t>ORDER BY queries on multiple properties:</a:t>
+            </a:r>
+            <a:endParaRPr lang="en-US" altLang="en-US" sz="2200" dirty="0">
+              <a:solidFill>
+                <a:schemeClr val="tx1"/>
+              </a:solidFill>
+            </a:endParaRPr>
+          </a:p>
+          <a:p>
+            <a:pPr lvl="0" eaLnBrk="0" fontAlgn="base" hangingPunct="0">
+              <a:lnSpc>
+                <a:spcPct val="100000"/>
+              </a:lnSpc>
+              <a:spcBef>
+                <a:spcPct val="0"/>
+              </a:spcBef>
+              <a:spcAft>
+                <a:spcPct val="0"/>
+              </a:spcAft>
+            </a:pPr>
+            <a:r>
+              <a:rPr lang="en-US" altLang="en-US" sz="2200" b="0" dirty="0">
+                <a:solidFill>
+                  <a:srgbClr val="000000"/>
+                </a:solidFill>
+              </a:rPr>
+              <a:t>SELECT * FROM container c ORDER BY </a:t>
+            </a:r>
+            <a:r>
+              <a:rPr lang="en-US" altLang="en-US" sz="2200" b="0" dirty="0" err="1">
+                <a:solidFill>
+                  <a:srgbClr val="000000"/>
+                </a:solidFill>
+              </a:rPr>
+              <a:t>c.firstName</a:t>
+            </a:r>
+            <a:r>
+              <a:rPr lang="en-US" altLang="en-US" sz="2200" b="0" dirty="0">
+                <a:solidFill>
+                  <a:srgbClr val="000000"/>
+                </a:solidFill>
+              </a:rPr>
+              <a:t>, </a:t>
+            </a:r>
+            <a:r>
+              <a:rPr lang="en-US" altLang="en-US" sz="2200" b="0" dirty="0" err="1">
+                <a:solidFill>
+                  <a:srgbClr val="000000"/>
+                </a:solidFill>
+              </a:rPr>
+              <a:t>c.lastName</a:t>
+            </a:r>
+            <a:endParaRPr lang="en-US" altLang="en-US" sz="2200" b="0" dirty="0">
+              <a:solidFill>
+                <a:schemeClr val="tx1"/>
+              </a:solidFill>
+            </a:endParaRPr>
+          </a:p>
+          <a:p>
+            <a:endParaRPr lang="en-US" sz="2800" dirty="0"/>
+          </a:p>
+          <a:p>
+            <a:r>
+              <a:rPr lang="en-US" sz="2800" dirty="0"/>
+              <a:t> </a:t>
+            </a:r>
+          </a:p>
+          <a:p>
+            <a:pPr eaLnBrk="0" fontAlgn="base" hangingPunct="0">
+              <a:lnSpc>
+                <a:spcPct val="100000"/>
+              </a:lnSpc>
+              <a:spcBef>
+                <a:spcPct val="0"/>
+              </a:spcBef>
+              <a:spcAft>
+                <a:spcPct val="0"/>
+              </a:spcAft>
+            </a:pPr>
+            <a:endParaRPr lang="en-US" altLang="en-US" sz="2400" b="0" dirty="0">
+              <a:solidFill>
+                <a:schemeClr val="tx1"/>
+              </a:solidFill>
+            </a:endParaRPr>
+          </a:p>
+          <a:p>
+            <a:endParaRPr lang="en-US" sz="2800" dirty="0"/>
+          </a:p>
+          <a:p>
+            <a:endParaRPr lang="en-US" sz="2800" dirty="0"/>
+          </a:p>
+          <a:p>
+            <a:endParaRPr lang="en-US" sz="2800" dirty="0"/>
+          </a:p>
+          <a:p>
+            <a:endParaRPr lang="en-US" sz="2800" dirty="0"/>
+          </a:p>
+          <a:p>
+            <a:endParaRPr lang="en-US" sz="2800" dirty="0"/>
+          </a:p>
+          <a:p>
+            <a:endParaRPr lang="en-US" sz="2800" dirty="0"/>
+          </a:p>
+          <a:p>
+            <a:endParaRPr lang="en-US" sz="2800" dirty="0"/>
+          </a:p>
+        </p:txBody>
+      </p:sp>
+    </p:spTree>
+    <p:extLst>
+      <p:ext uri="{BB962C8B-B14F-4D97-AF65-F5344CB8AC3E}">
+        <p14:creationId xmlns:p14="http://schemas.microsoft.com/office/powerpoint/2010/main" val="4144461712"/>
+      </p:ext>
+    </p:extLst>
+  </p:cSld>
+  <p:clrMapOvr>
+    <a:masterClrMapping/>
+  </p:clrMapOvr>
+  <p:transition>
+    <p:fade/>
+  </p:transition>
+</p:sld>
+</file>
+
+<file path=ppt/slides/slide35.xml><?xml version="1.0" encoding="utf-8"?>
+<p:sld xmlns:a="http://schemas.openxmlformats.org/drawingml/2006/main" xmlns:r="http://schemas.openxmlformats.org/officeDocument/2006/relationships" xmlns:p="http://schemas.openxmlformats.org/presentationml/2006/main">
+  <p:cSld>
+    <p:spTree>
+      <p:nvGrpSpPr>
+        <p:cNvPr id="1" name=""/>
+        <p:cNvGrpSpPr/>
+        <p:nvPr/>
+      </p:nvGrpSpPr>
+      <p:grpSpPr>
+        <a:xfrm>
+          <a:off x="0" y="0"/>
+          <a:ext cx="0" cy="0"/>
+          <a:chOff x="0" y="0"/>
+          <a:chExt cx="0" cy="0"/>
+        </a:xfrm>
+      </p:grpSpPr>
+      <p:sp>
+        <p:nvSpPr>
+          <p:cNvPr id="2" name="Title 1">
+            <a:extLst>
+              <a:ext uri="{FF2B5EF4-FFF2-40B4-BE49-F238E27FC236}">
+                <a16:creationId xmlns:a16="http://schemas.microsoft.com/office/drawing/2014/main" id="{E6CB0C23-EB23-442F-AA69-31B4837D2540}"/>
+              </a:ext>
+            </a:extLst>
+          </p:cNvPr>
+          <p:cNvSpPr>
+            <a:spLocks noGrp="1"/>
+          </p:cNvSpPr>
+          <p:nvPr>
+            <p:ph type="title"/>
+          </p:nvPr>
+        </p:nvSpPr>
+        <p:spPr/>
+        <p:txBody>
+          <a:bodyPr>
+            <a:normAutofit/>
+          </a:bodyPr>
+          <a:lstStyle/>
+          <a:p>
+            <a:r>
+              <a:rPr lang="en-US" sz="4000" dirty="0">
+                <a:latin typeface="Arial" panose="020B0604020202020204" pitchFamily="34" charset="0"/>
+                <a:cs typeface="Arial" panose="020B0604020202020204" pitchFamily="34" charset="0"/>
+              </a:rPr>
               <a:t>Online Index Transformations</a:t>
             </a:r>
           </a:p>
@@ -39602,7 +41507,7 @@
 </p:sld>
 </file>
 
-<file path=ppt/slides/slide33.xml><?xml version="1.0" encoding="utf-8"?>
+<file path=ppt/slides/slide36.xml><?xml version="1.0" encoding="utf-8"?>
 <p:sld xmlns:a="http://schemas.openxmlformats.org/drawingml/2006/main" xmlns:r="http://schemas.openxmlformats.org/officeDocument/2006/relationships" xmlns:p="http://schemas.openxmlformats.org/presentationml/2006/main">
   <p:cSld>
     <p:spTree>
@@ -39637,11 +41542,16 @@
         </p:nvSpPr>
         <p:spPr/>
         <p:txBody>
-          <a:bodyPr/>
+          <a:bodyPr>
+            <a:normAutofit/>
+          </a:bodyPr>
           <a:lstStyle/>
           <a:p>
             <a:r>
-              <a:rPr lang="en-US"/>
+              <a:rPr lang="en-US" sz="4000" dirty="0">
+                <a:latin typeface="Arial" panose="020B0604020202020204" pitchFamily="34" charset="0"/>
+                <a:cs typeface="Arial" panose="020B0604020202020204" pitchFamily="34" charset="0"/>
+              </a:rPr>
               <a:t>Index Tuning</a:t>
             </a:r>
           </a:p>
@@ -42305,7 +44215,7 @@
 </p:sld>
 </file>
 
-<file path=ppt/slides/slide34.xml><?xml version="1.0" encoding="utf-8"?>
+<file path=ppt/slides/slide37.xml><?xml version="1.0" encoding="utf-8"?>
 <p:sld xmlns:a="http://schemas.openxmlformats.org/drawingml/2006/main" xmlns:r="http://schemas.openxmlformats.org/officeDocument/2006/relationships" xmlns:p="http://schemas.openxmlformats.org/presentationml/2006/main">
   <p:cSld>
     <p:spTree>
@@ -42462,11 +44372,16 @@
         </p:nvSpPr>
         <p:spPr/>
         <p:txBody>
-          <a:bodyPr/>
+          <a:bodyPr>
+            <a:normAutofit/>
+          </a:bodyPr>
           <a:lstStyle/>
           <a:p>
             <a:r>
-              <a:rPr lang="en-US" dirty="0"/>
+              <a:rPr lang="en-US" sz="4000" dirty="0">
+                <a:latin typeface="Arial" panose="020B0604020202020204" pitchFamily="34" charset="0"/>
+                <a:cs typeface="Arial" panose="020B0604020202020204" pitchFamily="34" charset="0"/>
+              </a:rPr>
               <a:t>2 Extremes </a:t>
             </a:r>
           </a:p>
@@ -43437,7 +45352,14 @@
               <a:rPr lang="en-US" dirty="0">
                 <a:latin typeface="+mn-lt"/>
               </a:rPr>
-              <a:t>Contoso Restaurant Menu</a:t>
+              <a:t>Co</a:t>
+            </a:r>
+            <a:r>
+              <a:rPr lang="en-US" sz="4000" dirty="0">
+                <a:latin typeface="Arial" panose="020B0604020202020204" pitchFamily="34" charset="0"/>
+                <a:cs typeface="Arial" panose="020B0604020202020204" pitchFamily="34" charset="0"/>
+              </a:rPr>
+              <a:t>ntoso Restaurant Menu</a:t>
             </a:r>
           </a:p>
         </p:txBody>
@@ -44450,7 +46372,10 @@
           </a:lstStyle>
           <a:p>
             <a:r>
-              <a:rPr lang="en-US" dirty="0"/>
+              <a:rPr lang="en-US" sz="4000" dirty="0">
+                <a:latin typeface="Arial" panose="020B0604020202020204" pitchFamily="34" charset="0"/>
+                <a:cs typeface="Arial" panose="020B0604020202020204" pitchFamily="34" charset="0"/>
+              </a:rPr>
               <a:t>Number 1 question…</a:t>
             </a:r>
           </a:p>
@@ -45195,7 +47120,7 @@
         </p:nvSpPr>
         <p:spPr>
           <a:xfrm>
-            <a:off x="0" y="0"/>
+            <a:off x="200297" y="0"/>
             <a:ext cx="10515600" cy="1325563"/>
           </a:xfrm>
           <a:prstGeom prst="rect">
@@ -45646,7 +47571,7 @@
         </p:nvSpPr>
         <p:spPr>
           <a:xfrm>
-            <a:off x="0" y="0"/>
+            <a:off x="156755" y="0"/>
             <a:ext cx="10515600" cy="1325563"/>
           </a:xfrm>
         </p:spPr>
@@ -46789,7 +48714,7 @@
         </p:nvSpPr>
         <p:spPr>
           <a:xfrm>
-            <a:off x="0" y="0"/>
+            <a:off x="99060" y="0"/>
             <a:ext cx="10515600" cy="1325563"/>
           </a:xfrm>
           <a:prstGeom prst="rect">
@@ -48195,7 +50120,7 @@
 </file>
 
 <file path=customXml/itemProps1.xml><?xml version="1.0" encoding="utf-8"?>
-<ds:datastoreItem xmlns:ds="http://schemas.openxmlformats.org/officeDocument/2006/customXml" ds:itemID="{21A078F2-2CE7-4A00-AFB0-A6144267802C}">
+<ds:datastoreItem xmlns:ds="http://schemas.openxmlformats.org/officeDocument/2006/customXml" ds:itemID="{3D2DABB3-6646-48C4-BE5A-7BF5800B8A20}">
   <ds:schemaRefs>
     <ds:schemaRef ds:uri="http://schemas.microsoft.com/VisualStudio/2011/storyboarding/control"/>
   </ds:schemaRefs>
@@ -48203,7 +50128,7 @@
 </file>
 
 <file path=customXml/itemProps2.xml><?xml version="1.0" encoding="utf-8"?>
-<ds:datastoreItem xmlns:ds="http://schemas.openxmlformats.org/officeDocument/2006/customXml" ds:itemID="{3D2DABB3-6646-48C4-BE5A-7BF5800B8A20}">
+<ds:datastoreItem xmlns:ds="http://schemas.openxmlformats.org/officeDocument/2006/customXml" ds:itemID="{21A078F2-2CE7-4A00-AFB0-A6144267802C}">
   <ds:schemaRefs>
     <ds:schemaRef ds:uri="http://schemas.microsoft.com/VisualStudio/2011/storyboarding/control"/>
   </ds:schemaRefs>

</xml_diff>